<commit_message>
Add Shelly Plus Uni to project
</commit_message>
<xml_diff>
--- a/ressources/circuit_diagram.pptx
+++ b/ressources/circuit_diagram.pptx
@@ -6,6 +6,7 @@
   </p:sldMasterIdLst>
   <p:sldIdLst>
     <p:sldId id="256" r:id="rId2"/>
+    <p:sldId id="257" r:id="rId3"/>
   </p:sldIdLst>
   <p:sldSz cx="12192000" cy="6858000"/>
   <p:notesSz cx="6858000" cy="9144000"/>
@@ -105,6 +106,20 @@
     </a:lvl9pPr>
   </p:defaultTextStyle>
   <p:extLst>
+    <p:ext uri="{521415D9-36F7-43E2-AB2F-B90AF26B5E84}">
+      <p14:sectionLst xmlns:p14="http://schemas.microsoft.com/office/powerpoint/2010/main">
+        <p14:section name="Shelly Plus Uni" id="{1F346D97-926D-49BD-889E-DAD26020CE34}">
+          <p14:sldIdLst>
+            <p14:sldId id="256"/>
+          </p14:sldIdLst>
+        </p14:section>
+        <p14:section name="Shelly Uni" id="{6488CE94-53D3-4E81-9288-8CB5C1CA8F35}">
+          <p14:sldIdLst>
+            <p14:sldId id="257"/>
+          </p14:sldIdLst>
+        </p14:section>
+      </p14:sectionLst>
+    </p:ext>
     <p:ext uri="{EFAFB233-063F-42B5-8137-9DF3F51BA10A}">
       <p15:sldGuideLst xmlns:p15="http://schemas.microsoft.com/office/powerpoint/2012/main"/>
     </p:ext>
@@ -154,10 +169,9 @@
           </a:lstStyle>
           <a:p>
             <a:r>
-              <a:rPr lang="de-DE" smtClean="0"/>
+              <a:rPr lang="de-DE"/>
               <a:t>Titelmasterformat durch Klicken bearbeiten</a:t>
             </a:r>
-            <a:endParaRPr lang="de-DE"/>
           </a:p>
         </p:txBody>
       </p:sp>
@@ -219,10 +233,9 @@
           </a:lstStyle>
           <a:p>
             <a:r>
-              <a:rPr lang="de-DE" smtClean="0"/>
+              <a:rPr lang="de-DE"/>
               <a:t>Formatvorlage des Untertitelmasters durch Klicken bearbeiten</a:t>
             </a:r>
-            <a:endParaRPr lang="de-DE"/>
           </a:p>
         </p:txBody>
       </p:sp>
@@ -337,10 +350,9 @@
           <a:lstStyle/>
           <a:p>
             <a:r>
-              <a:rPr lang="de-DE" smtClean="0"/>
+              <a:rPr lang="de-DE"/>
               <a:t>Titelmasterformat durch Klicken bearbeiten</a:t>
             </a:r>
-            <a:endParaRPr lang="de-DE"/>
           </a:p>
         </p:txBody>
       </p:sp>
@@ -361,38 +373,37 @@
           <a:p>
             <a:pPr lvl="0"/>
             <a:r>
-              <a:rPr lang="de-DE" smtClean="0"/>
+              <a:rPr lang="de-DE"/>
               <a:t>Textmasterformat bearbeiten</a:t>
             </a:r>
           </a:p>
           <a:p>
             <a:pPr lvl="1"/>
             <a:r>
-              <a:rPr lang="de-DE" smtClean="0"/>
+              <a:rPr lang="de-DE"/>
               <a:t>Zweite Ebene</a:t>
             </a:r>
           </a:p>
           <a:p>
             <a:pPr lvl="2"/>
             <a:r>
-              <a:rPr lang="de-DE" smtClean="0"/>
+              <a:rPr lang="de-DE"/>
               <a:t>Dritte Ebene</a:t>
             </a:r>
           </a:p>
           <a:p>
             <a:pPr lvl="3"/>
             <a:r>
-              <a:rPr lang="de-DE" smtClean="0"/>
+              <a:rPr lang="de-DE"/>
               <a:t>Vierte Ebene</a:t>
             </a:r>
           </a:p>
           <a:p>
             <a:pPr lvl="4"/>
             <a:r>
-              <a:rPr lang="de-DE" smtClean="0"/>
+              <a:rPr lang="de-DE"/>
               <a:t>Fünfte Ebene</a:t>
             </a:r>
-            <a:endParaRPr lang="de-DE"/>
           </a:p>
         </p:txBody>
       </p:sp>
@@ -512,10 +523,9 @@
           <a:lstStyle/>
           <a:p>
             <a:r>
-              <a:rPr lang="de-DE" smtClean="0"/>
+              <a:rPr lang="de-DE"/>
               <a:t>Titelmasterformat durch Klicken bearbeiten</a:t>
             </a:r>
-            <a:endParaRPr lang="de-DE"/>
           </a:p>
         </p:txBody>
       </p:sp>
@@ -541,38 +551,37 @@
           <a:p>
             <a:pPr lvl="0"/>
             <a:r>
-              <a:rPr lang="de-DE" smtClean="0"/>
+              <a:rPr lang="de-DE"/>
               <a:t>Textmasterformat bearbeiten</a:t>
             </a:r>
           </a:p>
           <a:p>
             <a:pPr lvl="1"/>
             <a:r>
-              <a:rPr lang="de-DE" smtClean="0"/>
+              <a:rPr lang="de-DE"/>
               <a:t>Zweite Ebene</a:t>
             </a:r>
           </a:p>
           <a:p>
             <a:pPr lvl="2"/>
             <a:r>
-              <a:rPr lang="de-DE" smtClean="0"/>
+              <a:rPr lang="de-DE"/>
               <a:t>Dritte Ebene</a:t>
             </a:r>
           </a:p>
           <a:p>
             <a:pPr lvl="3"/>
             <a:r>
-              <a:rPr lang="de-DE" smtClean="0"/>
+              <a:rPr lang="de-DE"/>
               <a:t>Vierte Ebene</a:t>
             </a:r>
           </a:p>
           <a:p>
             <a:pPr lvl="4"/>
             <a:r>
-              <a:rPr lang="de-DE" smtClean="0"/>
+              <a:rPr lang="de-DE"/>
               <a:t>Fünfte Ebene</a:t>
             </a:r>
-            <a:endParaRPr lang="de-DE"/>
           </a:p>
         </p:txBody>
       </p:sp>
@@ -687,10 +696,9 @@
           <a:lstStyle/>
           <a:p>
             <a:r>
-              <a:rPr lang="de-DE" smtClean="0"/>
+              <a:rPr lang="de-DE"/>
               <a:t>Titelmasterformat durch Klicken bearbeiten</a:t>
             </a:r>
-            <a:endParaRPr lang="de-DE"/>
           </a:p>
         </p:txBody>
       </p:sp>
@@ -711,38 +719,37 @@
           <a:p>
             <a:pPr lvl="0"/>
             <a:r>
-              <a:rPr lang="de-DE" smtClean="0"/>
+              <a:rPr lang="de-DE"/>
               <a:t>Textmasterformat bearbeiten</a:t>
             </a:r>
           </a:p>
           <a:p>
             <a:pPr lvl="1"/>
             <a:r>
-              <a:rPr lang="de-DE" smtClean="0"/>
+              <a:rPr lang="de-DE"/>
               <a:t>Zweite Ebene</a:t>
             </a:r>
           </a:p>
           <a:p>
             <a:pPr lvl="2"/>
             <a:r>
-              <a:rPr lang="de-DE" smtClean="0"/>
+              <a:rPr lang="de-DE"/>
               <a:t>Dritte Ebene</a:t>
             </a:r>
           </a:p>
           <a:p>
             <a:pPr lvl="3"/>
             <a:r>
-              <a:rPr lang="de-DE" smtClean="0"/>
+              <a:rPr lang="de-DE"/>
               <a:t>Vierte Ebene</a:t>
             </a:r>
           </a:p>
           <a:p>
             <a:pPr lvl="4"/>
             <a:r>
-              <a:rPr lang="de-DE" smtClean="0"/>
+              <a:rPr lang="de-DE"/>
               <a:t>Fünfte Ebene</a:t>
             </a:r>
-            <a:endParaRPr lang="de-DE"/>
           </a:p>
         </p:txBody>
       </p:sp>
@@ -866,10 +873,9 @@
           </a:lstStyle>
           <a:p>
             <a:r>
-              <a:rPr lang="de-DE" smtClean="0"/>
+              <a:rPr lang="de-DE"/>
               <a:t>Titelmasterformat durch Klicken bearbeiten</a:t>
             </a:r>
-            <a:endParaRPr lang="de-DE"/>
           </a:p>
         </p:txBody>
       </p:sp>
@@ -986,7 +992,7 @@
           <a:p>
             <a:pPr lvl="0"/>
             <a:r>
-              <a:rPr lang="de-DE" smtClean="0"/>
+              <a:rPr lang="de-DE"/>
               <a:t>Textmasterformat bearbeiten</a:t>
             </a:r>
           </a:p>
@@ -1103,10 +1109,9 @@
           <a:lstStyle/>
           <a:p>
             <a:r>
-              <a:rPr lang="de-DE" smtClean="0"/>
+              <a:rPr lang="de-DE"/>
               <a:t>Titelmasterformat durch Klicken bearbeiten</a:t>
             </a:r>
-            <a:endParaRPr lang="de-DE"/>
           </a:p>
         </p:txBody>
       </p:sp>
@@ -1132,38 +1137,37 @@
           <a:p>
             <a:pPr lvl="0"/>
             <a:r>
-              <a:rPr lang="de-DE" smtClean="0"/>
+              <a:rPr lang="de-DE"/>
               <a:t>Textmasterformat bearbeiten</a:t>
             </a:r>
           </a:p>
           <a:p>
             <a:pPr lvl="1"/>
             <a:r>
-              <a:rPr lang="de-DE" smtClean="0"/>
+              <a:rPr lang="de-DE"/>
               <a:t>Zweite Ebene</a:t>
             </a:r>
           </a:p>
           <a:p>
             <a:pPr lvl="2"/>
             <a:r>
-              <a:rPr lang="de-DE" smtClean="0"/>
+              <a:rPr lang="de-DE"/>
               <a:t>Dritte Ebene</a:t>
             </a:r>
           </a:p>
           <a:p>
             <a:pPr lvl="3"/>
             <a:r>
-              <a:rPr lang="de-DE" smtClean="0"/>
+              <a:rPr lang="de-DE"/>
               <a:t>Vierte Ebene</a:t>
             </a:r>
           </a:p>
           <a:p>
             <a:pPr lvl="4"/>
             <a:r>
-              <a:rPr lang="de-DE" smtClean="0"/>
+              <a:rPr lang="de-DE"/>
               <a:t>Fünfte Ebene</a:t>
             </a:r>
-            <a:endParaRPr lang="de-DE"/>
           </a:p>
         </p:txBody>
       </p:sp>
@@ -1189,38 +1193,37 @@
           <a:p>
             <a:pPr lvl="0"/>
             <a:r>
-              <a:rPr lang="de-DE" smtClean="0"/>
+              <a:rPr lang="de-DE"/>
               <a:t>Textmasterformat bearbeiten</a:t>
             </a:r>
           </a:p>
           <a:p>
             <a:pPr lvl="1"/>
             <a:r>
-              <a:rPr lang="de-DE" smtClean="0"/>
+              <a:rPr lang="de-DE"/>
               <a:t>Zweite Ebene</a:t>
             </a:r>
           </a:p>
           <a:p>
             <a:pPr lvl="2"/>
             <a:r>
-              <a:rPr lang="de-DE" smtClean="0"/>
+              <a:rPr lang="de-DE"/>
               <a:t>Dritte Ebene</a:t>
             </a:r>
           </a:p>
           <a:p>
             <a:pPr lvl="3"/>
             <a:r>
-              <a:rPr lang="de-DE" smtClean="0"/>
+              <a:rPr lang="de-DE"/>
               <a:t>Vierte Ebene</a:t>
             </a:r>
           </a:p>
           <a:p>
             <a:pPr lvl="4"/>
             <a:r>
-              <a:rPr lang="de-DE" smtClean="0"/>
+              <a:rPr lang="de-DE"/>
               <a:t>Fünfte Ebene</a:t>
             </a:r>
-            <a:endParaRPr lang="de-DE"/>
           </a:p>
         </p:txBody>
       </p:sp>
@@ -1340,10 +1343,9 @@
           <a:lstStyle/>
           <a:p>
             <a:r>
-              <a:rPr lang="de-DE" smtClean="0"/>
+              <a:rPr lang="de-DE"/>
               <a:t>Titelmasterformat durch Klicken bearbeiten</a:t>
             </a:r>
-            <a:endParaRPr lang="de-DE"/>
           </a:p>
         </p:txBody>
       </p:sp>
@@ -1406,7 +1408,7 @@
           <a:p>
             <a:pPr lvl="0"/>
             <a:r>
-              <a:rPr lang="de-DE" smtClean="0"/>
+              <a:rPr lang="de-DE"/>
               <a:t>Textmasterformat bearbeiten</a:t>
             </a:r>
           </a:p>
@@ -1434,38 +1436,37 @@
           <a:p>
             <a:pPr lvl="0"/>
             <a:r>
-              <a:rPr lang="de-DE" smtClean="0"/>
+              <a:rPr lang="de-DE"/>
               <a:t>Textmasterformat bearbeiten</a:t>
             </a:r>
           </a:p>
           <a:p>
             <a:pPr lvl="1"/>
             <a:r>
-              <a:rPr lang="de-DE" smtClean="0"/>
+              <a:rPr lang="de-DE"/>
               <a:t>Zweite Ebene</a:t>
             </a:r>
           </a:p>
           <a:p>
             <a:pPr lvl="2"/>
             <a:r>
-              <a:rPr lang="de-DE" smtClean="0"/>
+              <a:rPr lang="de-DE"/>
               <a:t>Dritte Ebene</a:t>
             </a:r>
           </a:p>
           <a:p>
             <a:pPr lvl="3"/>
             <a:r>
-              <a:rPr lang="de-DE" smtClean="0"/>
+              <a:rPr lang="de-DE"/>
               <a:t>Vierte Ebene</a:t>
             </a:r>
           </a:p>
           <a:p>
             <a:pPr lvl="4"/>
             <a:r>
-              <a:rPr lang="de-DE" smtClean="0"/>
+              <a:rPr lang="de-DE"/>
               <a:t>Fünfte Ebene</a:t>
             </a:r>
-            <a:endParaRPr lang="de-DE"/>
           </a:p>
         </p:txBody>
       </p:sp>
@@ -1528,7 +1529,7 @@
           <a:p>
             <a:pPr lvl="0"/>
             <a:r>
-              <a:rPr lang="de-DE" smtClean="0"/>
+              <a:rPr lang="de-DE"/>
               <a:t>Textmasterformat bearbeiten</a:t>
             </a:r>
           </a:p>
@@ -1556,38 +1557,37 @@
           <a:p>
             <a:pPr lvl="0"/>
             <a:r>
-              <a:rPr lang="de-DE" smtClean="0"/>
+              <a:rPr lang="de-DE"/>
               <a:t>Textmasterformat bearbeiten</a:t>
             </a:r>
           </a:p>
           <a:p>
             <a:pPr lvl="1"/>
             <a:r>
-              <a:rPr lang="de-DE" smtClean="0"/>
+              <a:rPr lang="de-DE"/>
               <a:t>Zweite Ebene</a:t>
             </a:r>
           </a:p>
           <a:p>
             <a:pPr lvl="2"/>
             <a:r>
-              <a:rPr lang="de-DE" smtClean="0"/>
+              <a:rPr lang="de-DE"/>
               <a:t>Dritte Ebene</a:t>
             </a:r>
           </a:p>
           <a:p>
             <a:pPr lvl="3"/>
             <a:r>
-              <a:rPr lang="de-DE" smtClean="0"/>
+              <a:rPr lang="de-DE"/>
               <a:t>Vierte Ebene</a:t>
             </a:r>
           </a:p>
           <a:p>
             <a:pPr lvl="4"/>
             <a:r>
-              <a:rPr lang="de-DE" smtClean="0"/>
+              <a:rPr lang="de-DE"/>
               <a:t>Fünfte Ebene</a:t>
             </a:r>
-            <a:endParaRPr lang="de-DE"/>
           </a:p>
         </p:txBody>
       </p:sp>
@@ -1702,10 +1702,9 @@
           <a:lstStyle/>
           <a:p>
             <a:r>
-              <a:rPr lang="de-DE" smtClean="0"/>
+              <a:rPr lang="de-DE"/>
               <a:t>Titelmasterformat durch Klicken bearbeiten</a:t>
             </a:r>
-            <a:endParaRPr lang="de-DE"/>
           </a:p>
         </p:txBody>
       </p:sp>
@@ -1924,10 +1923,9 @@
           </a:lstStyle>
           <a:p>
             <a:r>
-              <a:rPr lang="de-DE" smtClean="0"/>
+              <a:rPr lang="de-DE"/>
               <a:t>Titelmasterformat durch Klicken bearbeiten</a:t>
             </a:r>
-            <a:endParaRPr lang="de-DE"/>
           </a:p>
         </p:txBody>
       </p:sp>
@@ -1981,38 +1979,37 @@
           <a:p>
             <a:pPr lvl="0"/>
             <a:r>
-              <a:rPr lang="de-DE" smtClean="0"/>
+              <a:rPr lang="de-DE"/>
               <a:t>Textmasterformat bearbeiten</a:t>
             </a:r>
           </a:p>
           <a:p>
             <a:pPr lvl="1"/>
             <a:r>
-              <a:rPr lang="de-DE" smtClean="0"/>
+              <a:rPr lang="de-DE"/>
               <a:t>Zweite Ebene</a:t>
             </a:r>
           </a:p>
           <a:p>
             <a:pPr lvl="2"/>
             <a:r>
-              <a:rPr lang="de-DE" smtClean="0"/>
+              <a:rPr lang="de-DE"/>
               <a:t>Dritte Ebene</a:t>
             </a:r>
           </a:p>
           <a:p>
             <a:pPr lvl="3"/>
             <a:r>
-              <a:rPr lang="de-DE" smtClean="0"/>
+              <a:rPr lang="de-DE"/>
               <a:t>Vierte Ebene</a:t>
             </a:r>
           </a:p>
           <a:p>
             <a:pPr lvl="4"/>
             <a:r>
-              <a:rPr lang="de-DE" smtClean="0"/>
+              <a:rPr lang="de-DE"/>
               <a:t>Fünfte Ebene</a:t>
             </a:r>
-            <a:endParaRPr lang="de-DE"/>
           </a:p>
         </p:txBody>
       </p:sp>
@@ -2075,7 +2072,7 @@
           <a:p>
             <a:pPr lvl="0"/>
             <a:r>
-              <a:rPr lang="de-DE" smtClean="0"/>
+              <a:rPr lang="de-DE"/>
               <a:t>Textmasterformat bearbeiten</a:t>
             </a:r>
           </a:p>
@@ -2201,10 +2198,9 @@
           </a:lstStyle>
           <a:p>
             <a:r>
-              <a:rPr lang="de-DE" smtClean="0"/>
+              <a:rPr lang="de-DE"/>
               <a:t>Titelmasterformat durch Klicken bearbeiten</a:t>
             </a:r>
-            <a:endParaRPr lang="de-DE"/>
           </a:p>
         </p:txBody>
       </p:sp>
@@ -2328,7 +2324,7 @@
           <a:p>
             <a:pPr lvl="0"/>
             <a:r>
-              <a:rPr lang="de-DE" smtClean="0"/>
+              <a:rPr lang="de-DE"/>
               <a:t>Textmasterformat bearbeiten</a:t>
             </a:r>
           </a:p>
@@ -2460,10 +2456,9 @@
           <a:lstStyle/>
           <a:p>
             <a:r>
-              <a:rPr lang="de-DE" smtClean="0"/>
+              <a:rPr lang="de-DE"/>
               <a:t>Titelmasterformat durch Klicken bearbeiten</a:t>
             </a:r>
-            <a:endParaRPr lang="de-DE"/>
           </a:p>
         </p:txBody>
       </p:sp>
@@ -2494,38 +2489,37 @@
           <a:p>
             <a:pPr lvl="0"/>
             <a:r>
-              <a:rPr lang="de-DE" smtClean="0"/>
+              <a:rPr lang="de-DE"/>
               <a:t>Textmasterformat bearbeiten</a:t>
             </a:r>
           </a:p>
           <a:p>
             <a:pPr lvl="1"/>
             <a:r>
-              <a:rPr lang="de-DE" smtClean="0"/>
+              <a:rPr lang="de-DE"/>
               <a:t>Zweite Ebene</a:t>
             </a:r>
           </a:p>
           <a:p>
             <a:pPr lvl="2"/>
             <a:r>
-              <a:rPr lang="de-DE" smtClean="0"/>
+              <a:rPr lang="de-DE"/>
               <a:t>Dritte Ebene</a:t>
             </a:r>
           </a:p>
           <a:p>
             <a:pPr lvl="3"/>
             <a:r>
-              <a:rPr lang="de-DE" smtClean="0"/>
+              <a:rPr lang="de-DE"/>
               <a:t>Vierte Ebene</a:t>
             </a:r>
           </a:p>
           <a:p>
             <a:pPr lvl="4"/>
             <a:r>
-              <a:rPr lang="de-DE" smtClean="0"/>
+              <a:rPr lang="de-DE"/>
               <a:t>Fünfte Ebene</a:t>
             </a:r>
-            <a:endParaRPr lang="de-DE"/>
           </a:p>
         </p:txBody>
       </p:sp>
@@ -2977,10 +2971,10 @@
         </p:nvGrpSpPr>
         <p:grpSpPr>
           <a:xfrm>
-            <a:off x="5063674" y="4099891"/>
-            <a:ext cx="2635828" cy="1540566"/>
-            <a:chOff x="6260192" y="3965713"/>
-            <a:chExt cx="2635828" cy="1540566"/>
+            <a:off x="5063674" y="4099890"/>
+            <a:ext cx="2642732" cy="1843663"/>
+            <a:chOff x="6260192" y="3965712"/>
+            <a:chExt cx="2642732" cy="1843663"/>
           </a:xfrm>
         </p:grpSpPr>
         <p:sp>
@@ -2991,8 +2985,8 @@
           </p:nvSpPr>
           <p:spPr>
             <a:xfrm>
-              <a:off x="6260192" y="3965713"/>
-              <a:ext cx="2635828" cy="1540566"/>
+              <a:off x="6260192" y="3965712"/>
+              <a:ext cx="2635828" cy="1843663"/>
             </a:xfrm>
             <a:prstGeom prst="roundRect">
               <a:avLst>
@@ -3032,7 +3026,7 @@
           <p:spPr>
             <a:xfrm>
               <a:off x="6439094" y="4009715"/>
-              <a:ext cx="1032655" cy="1446550"/>
+              <a:ext cx="906017" cy="1785104"/>
             </a:xfrm>
             <a:prstGeom prst="rect">
               <a:avLst/>
@@ -3046,55 +3040,63 @@
             <a:lstStyle/>
             <a:p>
               <a:r>
-                <a:rPr lang="de-DE" sz="1100" dirty="0" smtClean="0"/>
-                <a:t>VCC</a:t>
-              </a:r>
-              <a:endParaRPr lang="de-DE" sz="1100" dirty="0" smtClean="0"/>
-            </a:p>
-            <a:p>
-              <a:r>
-                <a:rPr lang="de-DE" sz="1100" dirty="0" smtClean="0"/>
-                <a:t>GND</a:t>
-              </a:r>
-              <a:endParaRPr lang="de-DE" sz="1100" dirty="0" smtClean="0"/>
-            </a:p>
-            <a:p>
-              <a:r>
-                <a:rPr lang="de-DE" sz="1100" dirty="0" smtClean="0"/>
-                <a:t>ADC_IN </a:t>
+                <a:rPr lang="de-DE" sz="1100" dirty="0"/>
+                <a:t>VAC1</a:t>
               </a:r>
             </a:p>
             <a:p>
               <a:r>
-                <a:rPr lang="de-DE" sz="1100" dirty="0" smtClean="0"/>
-                <a:t>VCC_SENSOR</a:t>
+                <a:rPr lang="de-DE" sz="1100" dirty="0"/>
+                <a:t>VAC2</a:t>
               </a:r>
             </a:p>
             <a:p>
               <a:r>
-                <a:rPr lang="de-DE" sz="1100" dirty="0" smtClean="0"/>
-                <a:t>DATA_SENSOR</a:t>
+                <a:rPr lang="de-DE" sz="1100" dirty="0"/>
+                <a:t>ANALOG IN </a:t>
               </a:r>
             </a:p>
             <a:p>
               <a:r>
-                <a:rPr lang="de-DE" sz="1100" dirty="0" smtClean="0"/>
-                <a:t>GND_SENSOR</a:t>
+                <a:rPr lang="de-DE" sz="1100" dirty="0"/>
+                <a:t>SENSOR VCC</a:t>
               </a:r>
-              <a:endParaRPr lang="de-DE" sz="1100" dirty="0" smtClean="0"/>
             </a:p>
             <a:p>
               <a:r>
-                <a:rPr lang="de-DE" sz="1100" dirty="0" smtClean="0"/>
+                <a:rPr lang="de-DE" sz="1100" dirty="0"/>
+                <a:t>DATA</a:t>
+              </a:r>
+            </a:p>
+            <a:p>
+              <a:r>
+                <a:rPr lang="de-DE" sz="1100" dirty="0"/>
+                <a:t>+5V VDC</a:t>
+              </a:r>
+            </a:p>
+            <a:p>
+              <a:r>
+                <a:rPr lang="de-DE" sz="1100" dirty="0"/>
+                <a:t>GND</a:t>
+              </a:r>
+            </a:p>
+            <a:p>
+              <a:r>
+                <a:rPr lang="de-DE" sz="1100" dirty="0"/>
+                <a:t>COUNT IN</a:t>
+              </a:r>
+            </a:p>
+            <a:p>
+              <a:r>
+                <a:rPr lang="de-DE" sz="1100" dirty="0"/>
                 <a:t>IN_1</a:t>
               </a:r>
             </a:p>
             <a:p>
               <a:r>
-                <a:rPr lang="de-DE" sz="1100" dirty="0" smtClean="0"/>
+                <a:rPr lang="de-DE" sz="1100" dirty="0"/>
                 <a:t>IN_2</a:t>
               </a:r>
-              <a:endParaRPr lang="de-DE" sz="1100" dirty="0"/>
             </a:p>
           </p:txBody>
         </p:sp>
@@ -3106,7 +3108,7 @@
           </p:nvSpPr>
           <p:spPr>
             <a:xfrm>
-              <a:off x="8219168" y="4019654"/>
+              <a:off x="8226072" y="4164383"/>
               <a:ext cx="676852" cy="1438855"/>
             </a:xfrm>
             <a:prstGeom prst="rect">
@@ -3122,7 +3124,7 @@
             <a:p>
               <a:pPr algn="r"/>
               <a:r>
-                <a:rPr lang="de-DE" sz="1250" dirty="0" smtClean="0"/>
+                <a:rPr lang="de-DE" sz="1250" dirty="0"/>
                 <a:t>Out 1 A</a:t>
               </a:r>
             </a:p>
@@ -3133,7 +3135,7 @@
             <a:p>
               <a:pPr algn="r"/>
               <a:r>
-                <a:rPr lang="de-DE" sz="1250" dirty="0" smtClean="0"/>
+                <a:rPr lang="de-DE" sz="1250" dirty="0"/>
                 <a:t>Out 1 B</a:t>
               </a:r>
             </a:p>
@@ -3144,7 +3146,7 @@
             <a:p>
               <a:pPr algn="r"/>
               <a:r>
-                <a:rPr lang="de-DE" sz="1250" dirty="0" smtClean="0"/>
+                <a:rPr lang="de-DE" sz="1250" dirty="0"/>
                 <a:t>Out 2 A</a:t>
               </a:r>
             </a:p>
@@ -3155,10 +3157,9 @@
             <a:p>
               <a:pPr algn="r"/>
               <a:r>
-                <a:rPr lang="de-DE" sz="1250" dirty="0" smtClean="0"/>
+                <a:rPr lang="de-DE" sz="1250" dirty="0"/>
                 <a:t>Out 2 B</a:t>
               </a:r>
-              <a:endParaRPr lang="de-DE" sz="1250" dirty="0"/>
             </a:p>
           </p:txBody>
         </p:sp>
@@ -3170,8 +3171,8 @@
           </p:nvSpPr>
           <p:spPr>
             <a:xfrm rot="16200000">
-              <a:off x="7582947" y="4596736"/>
-              <a:ext cx="931665" cy="307777"/>
+              <a:off x="7417585" y="4713728"/>
+              <a:ext cx="1247457" cy="307777"/>
             </a:xfrm>
             <a:prstGeom prst="rect">
               <a:avLst/>
@@ -3185,10 +3186,9 @@
             <a:lstStyle/>
             <a:p>
               <a:r>
-                <a:rPr lang="de-DE" sz="1400" dirty="0" smtClean="0"/>
-                <a:t>Shelly UNI</a:t>
+                <a:rPr lang="de-DE" sz="1400" dirty="0"/>
+                <a:t>Shelly Plus Uni</a:t>
               </a:r>
-              <a:endParaRPr lang="de-DE" sz="1400" dirty="0"/>
             </a:p>
           </p:txBody>
         </p:sp>
@@ -3316,9 +3316,7 @@
           </a:prstGeom>
           <a:ln w="28575">
             <a:solidFill>
-              <a:schemeClr val="accent4">
-                <a:lumMod val="75000"/>
-              </a:schemeClr>
+              <a:srgbClr val="FF0000"/>
             </a:solidFill>
           </a:ln>
         </p:spPr>
@@ -3647,17 +3645,16 @@
             <a:p>
               <a:pPr algn="ctr"/>
               <a:r>
-                <a:rPr lang="de-DE" sz="1200" dirty="0" smtClean="0"/>
+                <a:rPr lang="de-DE" sz="1200" dirty="0"/>
                 <a:t>Doorbell </a:t>
               </a:r>
             </a:p>
             <a:p>
               <a:pPr algn="ctr"/>
               <a:r>
-                <a:rPr lang="de-DE" sz="1200" dirty="0" smtClean="0"/>
+                <a:rPr lang="de-DE" sz="1200" dirty="0"/>
                 <a:t>Push Button</a:t>
               </a:r>
-              <a:endParaRPr lang="de-DE" sz="1200" dirty="0"/>
             </a:p>
           </p:txBody>
         </p:sp>
@@ -3861,17 +3858,16 @@
             <a:p>
               <a:pPr algn="ctr"/>
               <a:r>
-                <a:rPr lang="de-DE" sz="1200" dirty="0" smtClean="0"/>
+                <a:rPr lang="de-DE" sz="1200" dirty="0"/>
                 <a:t>Doorbell </a:t>
               </a:r>
             </a:p>
             <a:p>
               <a:pPr algn="ctr"/>
               <a:r>
-                <a:rPr lang="de-DE" sz="1200" dirty="0" smtClean="0"/>
+                <a:rPr lang="de-DE" sz="1200" dirty="0"/>
                 <a:t>Chime</a:t>
               </a:r>
-              <a:endParaRPr lang="de-DE" sz="1200" dirty="0"/>
             </a:p>
           </p:txBody>
         </p:sp>
@@ -3987,10 +3983,9 @@
             <a:p>
               <a:pPr algn="ctr"/>
               <a:r>
-                <a:rPr lang="de-DE" sz="1200" b="1" dirty="0" smtClean="0"/>
+                <a:rPr lang="de-DE" sz="1200" b="1" dirty="0"/>
                 <a:t>230V AC</a:t>
               </a:r>
-              <a:endParaRPr lang="de-DE" sz="1200" b="1" dirty="0"/>
             </a:p>
           </p:txBody>
         </p:sp>
@@ -4017,17 +4012,16 @@
             <a:p>
               <a:pPr algn="ctr"/>
               <a:r>
-                <a:rPr lang="de-DE" sz="1200" dirty="0" smtClean="0"/>
+                <a:rPr lang="de-DE" sz="1200" dirty="0"/>
                 <a:t>Doorbell </a:t>
               </a:r>
             </a:p>
             <a:p>
               <a:pPr algn="ctr"/>
               <a:r>
-                <a:rPr lang="de-DE" sz="1200" dirty="0" smtClean="0"/>
+                <a:rPr lang="de-DE" sz="1200" dirty="0"/>
                 <a:t>Transformer</a:t>
               </a:r>
-              <a:endParaRPr lang="de-DE" sz="1200" dirty="0"/>
             </a:p>
           </p:txBody>
         </p:sp>
@@ -4090,10 +4084,9 @@
             <a:p>
               <a:pPr algn="ctr"/>
               <a:r>
-                <a:rPr lang="de-DE" sz="1200" b="1" dirty="0" smtClean="0"/>
+                <a:rPr lang="de-DE" sz="1200" b="1" dirty="0"/>
                 <a:t>12V AC</a:t>
               </a:r>
-              <a:endParaRPr lang="de-DE" sz="1200" b="1" dirty="0"/>
             </a:p>
           </p:txBody>
         </p:sp>
@@ -4114,9 +4107,7 @@
           </a:prstGeom>
           <a:ln w="28575">
             <a:solidFill>
-              <a:schemeClr val="accent4">
-                <a:lumMod val="75000"/>
-              </a:schemeClr>
+              <a:srgbClr val="FF0000"/>
             </a:solidFill>
           </a:ln>
         </p:spPr>
@@ -4151,9 +4142,7 @@
           </a:prstGeom>
           <a:ln w="28575">
             <a:solidFill>
-              <a:schemeClr val="accent4">
-                <a:lumMod val="75000"/>
-              </a:schemeClr>
+              <a:srgbClr val="FF0000"/>
             </a:solidFill>
           </a:ln>
         </p:spPr>
@@ -4188,9 +4177,7 @@
           </a:prstGeom>
           <a:ln w="28575">
             <a:solidFill>
-              <a:schemeClr val="accent4">
-                <a:lumMod val="75000"/>
-              </a:schemeClr>
+              <a:srgbClr val="FF0000"/>
             </a:solidFill>
           </a:ln>
         </p:spPr>
@@ -4225,9 +4212,7 @@
           </a:prstGeom>
           <a:ln w="28575">
             <a:solidFill>
-              <a:schemeClr val="accent4">
-                <a:lumMod val="75000"/>
-              </a:schemeClr>
+              <a:srgbClr val="FF0000"/>
             </a:solidFill>
           </a:ln>
         </p:spPr>
@@ -4262,9 +4247,7 @@
           </a:prstGeom>
           <a:ln w="28575">
             <a:solidFill>
-              <a:schemeClr val="accent4">
-                <a:lumMod val="75000"/>
-              </a:schemeClr>
+              <a:srgbClr val="FF0000"/>
             </a:solidFill>
           </a:ln>
         </p:spPr>
@@ -4404,9 +4387,7 @@
           </a:prstGeom>
           <a:ln w="28575">
             <a:solidFill>
-              <a:schemeClr val="accent4">
-                <a:lumMod val="75000"/>
-              </a:schemeClr>
+              <a:srgbClr val="FF0000"/>
             </a:solidFill>
           </a:ln>
         </p:spPr>
@@ -4541,10 +4522,9 @@
           <a:p>
             <a:pPr algn="ctr"/>
             <a:r>
-              <a:rPr lang="de-DE" sz="1200" dirty="0" smtClean="0"/>
+              <a:rPr lang="de-DE" sz="1200" dirty="0"/>
               <a:t>Location 2</a:t>
             </a:r>
-            <a:endParaRPr lang="de-DE" sz="1200" dirty="0"/>
           </a:p>
         </p:txBody>
       </p:sp>
@@ -4572,30 +4552,31 @@
           <a:p>
             <a:pPr algn="ctr"/>
             <a:r>
-              <a:rPr lang="de-DE" sz="1200" dirty="0" smtClean="0"/>
+              <a:rPr lang="de-DE" sz="1200" dirty="0"/>
               <a:t>Location 3</a:t>
             </a:r>
-            <a:endParaRPr lang="de-DE" sz="1200" dirty="0"/>
           </a:p>
         </p:txBody>
       </p:sp>
       <p:cxnSp>
         <p:nvCxnSpPr>
           <p:cNvPr id="106" name="Gerader Verbinder 105"/>
-          <p:cNvCxnSpPr/>
+          <p:cNvCxnSpPr>
+            <a:cxnSpLocks/>
+          </p:cNvCxnSpPr>
           <p:nvPr/>
         </p:nvCxnSpPr>
         <p:spPr>
           <a:xfrm>
-            <a:off x="4820480" y="5258699"/>
-            <a:ext cx="243194" cy="2373"/>
+            <a:off x="4818613" y="5623150"/>
+            <a:ext cx="261145" cy="0"/>
           </a:xfrm>
           <a:prstGeom prst="line">
             <a:avLst/>
           </a:prstGeom>
           <a:ln w="28575">
             <a:solidFill>
-              <a:srgbClr val="00B0F0"/>
+              <a:srgbClr val="FFC000"/>
             </a:solidFill>
           </a:ln>
         </p:spPr>
@@ -4617,20 +4598,22 @@
       <p:cxnSp>
         <p:nvCxnSpPr>
           <p:cNvPr id="108" name="Gerader Verbinder 107"/>
-          <p:cNvCxnSpPr/>
+          <p:cNvCxnSpPr>
+            <a:cxnSpLocks/>
+          </p:cNvCxnSpPr>
           <p:nvPr/>
         </p:nvCxnSpPr>
         <p:spPr>
           <a:xfrm>
             <a:off x="4811942" y="3338424"/>
-            <a:ext cx="6581" cy="1920275"/>
+            <a:ext cx="13342" cy="2284726"/>
           </a:xfrm>
           <a:prstGeom prst="line">
             <a:avLst/>
           </a:prstGeom>
           <a:ln w="28575">
             <a:solidFill>
-              <a:srgbClr val="00B0F0"/>
+              <a:srgbClr val="FFC000"/>
             </a:solidFill>
           </a:ln>
         </p:spPr>
@@ -4700,7 +4683,7 @@
           </a:prstGeom>
           <a:ln w="28575">
             <a:solidFill>
-              <a:srgbClr val="00B0F0"/>
+              <a:srgbClr val="FFC000"/>
             </a:solidFill>
           </a:ln>
         </p:spPr>
@@ -4770,9 +4753,7 @@
           </a:prstGeom>
           <a:ln w="28575">
             <a:solidFill>
-              <a:schemeClr val="accent4">
-                <a:lumMod val="75000"/>
-              </a:schemeClr>
+              <a:srgbClr val="FF0000"/>
             </a:solidFill>
           </a:ln>
         </p:spPr>
@@ -4861,55 +4842,8 @@
           <a:p>
             <a:pPr algn="ctr"/>
             <a:r>
-              <a:rPr lang="de-DE" sz="1200" dirty="0" smtClean="0"/>
+              <a:rPr lang="de-DE" sz="1200" dirty="0"/>
               <a:t>Location 1</a:t>
-            </a:r>
-            <a:endParaRPr lang="de-DE" sz="1200" dirty="0"/>
-          </a:p>
-        </p:txBody>
-      </p:sp>
-      <p:sp>
-        <p:nvSpPr>
-          <p:cNvPr id="138" name="Rechteck 137"/>
-          <p:cNvSpPr/>
-          <p:nvPr/>
-        </p:nvSpPr>
-        <p:spPr>
-          <a:xfrm>
-            <a:off x="5579581" y="5212467"/>
-            <a:ext cx="819455" cy="369332"/>
-          </a:xfrm>
-          <a:prstGeom prst="rect">
-            <a:avLst/>
-          </a:prstGeom>
-        </p:spPr>
-        <p:txBody>
-          <a:bodyPr wrap="none">
-            <a:spAutoFit/>
-          </a:bodyPr>
-          <a:lstStyle/>
-          <a:p>
-            <a:r>
-              <a:rPr lang="de-DE" sz="900" dirty="0" smtClean="0">
-                <a:solidFill>
-                  <a:schemeClr val="bg1">
-                    <a:lumMod val="50000"/>
-                  </a:schemeClr>
-                </a:solidFill>
-              </a:rPr>
-              <a:t>AC 12V - 24V</a:t>
-            </a:r>
-          </a:p>
-          <a:p>
-            <a:r>
-              <a:rPr lang="de-DE" sz="900" dirty="0" smtClean="0">
-                <a:solidFill>
-                  <a:schemeClr val="bg1">
-                    <a:lumMod val="50000"/>
-                  </a:schemeClr>
-                </a:solidFill>
-              </a:rPr>
-              <a:t>DC 2,2V - 36V</a:t>
             </a:r>
           </a:p>
         </p:txBody>
@@ -4922,8 +4856,8 @@
         </p:nvSpPr>
         <p:spPr>
           <a:xfrm>
-            <a:off x="5594009" y="4143893"/>
-            <a:ext cx="790601" cy="369332"/>
+            <a:off x="5632377" y="4143893"/>
+            <a:ext cx="732893" cy="369332"/>
           </a:xfrm>
           <a:prstGeom prst="rect">
             <a:avLst/>
@@ -4936,26 +4870,26 @@
           <a:lstStyle/>
           <a:p>
             <a:r>
-              <a:rPr lang="de-DE" sz="900" dirty="0" smtClean="0">
+              <a:rPr lang="de-DE" sz="900" dirty="0">
                 <a:solidFill>
                   <a:schemeClr val="bg1">
                     <a:lumMod val="50000"/>
                   </a:schemeClr>
                 </a:solidFill>
               </a:rPr>
-              <a:t>AC 12V - 24V</a:t>
+              <a:t>AC 8V - 27V</a:t>
             </a:r>
           </a:p>
           <a:p>
             <a:r>
-              <a:rPr lang="de-DE" sz="900" dirty="0" smtClean="0">
+              <a:rPr lang="de-DE" sz="900" dirty="0">
                 <a:solidFill>
                   <a:schemeClr val="bg1">
                     <a:lumMod val="50000"/>
                   </a:schemeClr>
                 </a:solidFill>
               </a:rPr>
-              <a:t>DC 12V - 36V</a:t>
+              <a:t>DC 9V - 28V</a:t>
             </a:r>
           </a:p>
         </p:txBody>
@@ -4969,14 +4903,14 @@
           <p:nvPr>
             <p:extLst>
               <p:ext uri="{D42A27DB-BD31-4B8C-83A1-F6EECF244321}">
-                <p14:modId xmlns:p14="http://schemas.microsoft.com/office/powerpoint/2010/main" val="446463128"/>
+                <p14:modId xmlns:p14="http://schemas.microsoft.com/office/powerpoint/2010/main" val="3856700458"/>
               </p:ext>
             </p:extLst>
           </p:nvPr>
         </p:nvGraphicFramePr>
         <p:xfrm>
           <a:off x="5068807" y="4212447"/>
-          <a:ext cx="208280" cy="1307520"/>
+          <a:ext cx="208280" cy="1634400"/>
         </p:xfrm>
         <a:graphic>
           <a:graphicData uri="http://schemas.openxmlformats.org/drawingml/2006/table">
@@ -4985,7 +4919,13 @@
                 <a:tableStyleId>{5940675A-B579-460E-94D1-54222C63F5DA}</a:tableStyleId>
               </a:tblPr>
               <a:tblGrid>
-                <a:gridCol w="208280"/>
+                <a:gridCol w="208280">
+                  <a:extLst>
+                    <a:ext uri="{9D8B030D-6E8A-4147-A177-3AD203B41FA5}">
+                      <a16:colId xmlns:a16="http://schemas.microsoft.com/office/drawing/2014/main" val="20000"/>
+                    </a:ext>
+                  </a:extLst>
+                </a:gridCol>
               </a:tblGrid>
               <a:tr h="153141">
                 <a:tc>
@@ -4995,10 +4935,9 @@
                     <a:p>
                       <a:pPr algn="ctr"/>
                       <a:r>
-                        <a:rPr lang="de-DE" sz="600" dirty="0" smtClean="0"/>
+                        <a:rPr lang="de-DE" sz="600" dirty="0"/>
                         <a:t>1</a:t>
                       </a:r>
-                      <a:endParaRPr lang="de-DE" sz="600" dirty="0"/>
                     </a:p>
                   </a:txBody>
                   <a:tcPr marL="36000" marR="36000" marT="36000" marB="36000" anchor="ctr">
@@ -5007,6 +4946,11 @@
                     </a:solidFill>
                   </a:tcPr>
                 </a:tc>
+                <a:extLst>
+                  <a:ext uri="{0D108BD9-81ED-4DB2-BD59-A6C34878D82A}">
+                    <a16:rowId xmlns:a16="http://schemas.microsoft.com/office/drawing/2014/main" val="10000"/>
+                  </a:ext>
+                </a:extLst>
               </a:tr>
               <a:tr h="153141">
                 <a:tc>
@@ -5016,10 +4960,9 @@
                     <a:p>
                       <a:pPr algn="ctr"/>
                       <a:r>
-                        <a:rPr lang="de-DE" sz="600" dirty="0" smtClean="0"/>
+                        <a:rPr lang="de-DE" sz="600" dirty="0"/>
                         <a:t>2</a:t>
                       </a:r>
-                      <a:endParaRPr lang="de-DE" sz="600" dirty="0"/>
                     </a:p>
                   </a:txBody>
                   <a:tcPr marL="36000" marR="36000" marT="36000" marB="36000" anchor="ctr">
@@ -5031,6 +4974,11 @@
                     </a:solidFill>
                   </a:tcPr>
                 </a:tc>
+                <a:extLst>
+                  <a:ext uri="{0D108BD9-81ED-4DB2-BD59-A6C34878D82A}">
+                    <a16:rowId xmlns:a16="http://schemas.microsoft.com/office/drawing/2014/main" val="10001"/>
+                  </a:ext>
+                </a:extLst>
               </a:tr>
               <a:tr h="153141">
                 <a:tc>
@@ -5040,10 +4988,9 @@
                     <a:p>
                       <a:pPr algn="ctr"/>
                       <a:r>
-                        <a:rPr lang="de-DE" sz="600" dirty="0" smtClean="0"/>
+                        <a:rPr lang="de-DE" sz="600" dirty="0"/>
                         <a:t>3</a:t>
                       </a:r>
-                      <a:endParaRPr lang="de-DE" sz="600" dirty="0"/>
                     </a:p>
                   </a:txBody>
                   <a:tcPr marL="36000" marR="36000" marT="36000" marB="36000" anchor="ctr">
@@ -5054,6 +5001,11 @@
                     </a:solidFill>
                   </a:tcPr>
                 </a:tc>
+                <a:extLst>
+                  <a:ext uri="{0D108BD9-81ED-4DB2-BD59-A6C34878D82A}">
+                    <a16:rowId xmlns:a16="http://schemas.microsoft.com/office/drawing/2014/main" val="10002"/>
+                  </a:ext>
+                </a:extLst>
               </a:tr>
               <a:tr h="153141">
                 <a:tc>
@@ -5063,10 +5015,9 @@
                     <a:p>
                       <a:pPr algn="ctr"/>
                       <a:r>
-                        <a:rPr lang="de-DE" sz="600" dirty="0" smtClean="0"/>
+                        <a:rPr lang="de-DE" sz="600" dirty="0"/>
                         <a:t>4</a:t>
                       </a:r>
-                      <a:endParaRPr lang="de-DE" sz="600" dirty="0"/>
                     </a:p>
                   </a:txBody>
                   <a:tcPr marL="36000" marR="36000" marT="36000" marB="36000" anchor="ctr">
@@ -5075,6 +5026,11 @@
                     </a:solidFill>
                   </a:tcPr>
                 </a:tc>
+                <a:extLst>
+                  <a:ext uri="{0D108BD9-81ED-4DB2-BD59-A6C34878D82A}">
+                    <a16:rowId xmlns:a16="http://schemas.microsoft.com/office/drawing/2014/main" val="10003"/>
+                  </a:ext>
+                </a:extLst>
               </a:tr>
               <a:tr h="153141">
                 <a:tc>
@@ -5084,10 +5040,9 @@
                     <a:p>
                       <a:pPr algn="ctr"/>
                       <a:r>
-                        <a:rPr lang="de-DE" sz="600" dirty="0" smtClean="0"/>
+                        <a:rPr lang="de-DE" sz="600" dirty="0"/>
                         <a:t>5</a:t>
                       </a:r>
-                      <a:endParaRPr lang="de-DE" sz="600" dirty="0"/>
                     </a:p>
                   </a:txBody>
                   <a:tcPr marL="36000" marR="36000" marT="36000" marB="36000" anchor="ctr">
@@ -5096,6 +5051,11 @@
                     </a:solidFill>
                   </a:tcPr>
                 </a:tc>
+                <a:extLst>
+                  <a:ext uri="{0D108BD9-81ED-4DB2-BD59-A6C34878D82A}">
+                    <a16:rowId xmlns:a16="http://schemas.microsoft.com/office/drawing/2014/main" val="10004"/>
+                  </a:ext>
+                </a:extLst>
               </a:tr>
               <a:tr h="153141">
                 <a:tc>
@@ -5105,18 +5065,24 @@
                     <a:p>
                       <a:pPr algn="ctr"/>
                       <a:r>
-                        <a:rPr lang="de-DE" sz="600" dirty="0" smtClean="0"/>
+                        <a:rPr lang="de-DE" sz="600" dirty="0"/>
                         <a:t>6</a:t>
                       </a:r>
-                      <a:endParaRPr lang="de-DE" sz="600" dirty="0"/>
                     </a:p>
                   </a:txBody>
                   <a:tcPr marL="36000" marR="36000" marT="36000" marB="36000" anchor="ctr">
                     <a:solidFill>
-                      <a:srgbClr val="00B050"/>
+                      <a:schemeClr val="bg2">
+                        <a:lumMod val="75000"/>
+                      </a:schemeClr>
                     </a:solidFill>
                   </a:tcPr>
                 </a:tc>
+                <a:extLst>
+                  <a:ext uri="{0D108BD9-81ED-4DB2-BD59-A6C34878D82A}">
+                    <a16:rowId xmlns:a16="http://schemas.microsoft.com/office/drawing/2014/main" val="254892410"/>
+                  </a:ext>
+                </a:extLst>
               </a:tr>
               <a:tr h="153141">
                 <a:tc>
@@ -5126,20 +5092,22 @@
                     <a:p>
                       <a:pPr algn="ctr"/>
                       <a:r>
-                        <a:rPr lang="de-DE" sz="600" dirty="0" smtClean="0"/>
+                        <a:rPr lang="de-DE" sz="600" dirty="0"/>
                         <a:t>7</a:t>
                       </a:r>
-                      <a:endParaRPr lang="de-DE" sz="600" dirty="0"/>
                     </a:p>
                   </a:txBody>
                   <a:tcPr marL="36000" marR="36000" marT="36000" marB="36000" anchor="ctr">
                     <a:solidFill>
-                      <a:schemeClr val="accent2">
-                        <a:lumMod val="75000"/>
-                      </a:schemeClr>
+                      <a:srgbClr val="00B050"/>
                     </a:solidFill>
                   </a:tcPr>
                 </a:tc>
+                <a:extLst>
+                  <a:ext uri="{0D108BD9-81ED-4DB2-BD59-A6C34878D82A}">
+                    <a16:rowId xmlns:a16="http://schemas.microsoft.com/office/drawing/2014/main" val="10005"/>
+                  </a:ext>
+                </a:extLst>
               </a:tr>
               <a:tr h="153141">
                 <a:tc>
@@ -5149,10 +5117,59 @@
                     <a:p>
                       <a:pPr algn="ctr"/>
                       <a:r>
-                        <a:rPr lang="de-DE" sz="600" dirty="0" smtClean="0"/>
+                        <a:rPr lang="de-DE" sz="600" dirty="0"/>
                         <a:t>8</a:t>
                       </a:r>
-                      <a:endParaRPr lang="de-DE" sz="600" dirty="0"/>
+                    </a:p>
+                  </a:txBody>
+                  <a:tcPr marL="36000" marR="36000" marT="36000" marB="36000" anchor="ctr">
+                    <a:solidFill>
+                      <a:srgbClr val="7030A0"/>
+                    </a:solidFill>
+                  </a:tcPr>
+                </a:tc>
+                <a:extLst>
+                  <a:ext uri="{0D108BD9-81ED-4DB2-BD59-A6C34878D82A}">
+                    <a16:rowId xmlns:a16="http://schemas.microsoft.com/office/drawing/2014/main" val="493456452"/>
+                  </a:ext>
+                </a:extLst>
+              </a:tr>
+              <a:tr h="153141">
+                <a:tc>
+                  <a:txBody>
+                    <a:bodyPr/>
+                    <a:lstStyle/>
+                    <a:p>
+                      <a:pPr algn="ctr"/>
+                      <a:r>
+                        <a:rPr lang="de-DE" sz="600" dirty="0"/>
+                        <a:t>9</a:t>
+                      </a:r>
+                    </a:p>
+                  </a:txBody>
+                  <a:tcPr marL="36000" marR="36000" marT="36000" marB="36000" anchor="ctr">
+                    <a:solidFill>
+                      <a:srgbClr val="FFC000"/>
+                    </a:solidFill>
+                  </a:tcPr>
+                </a:tc>
+                <a:extLst>
+                  <a:ext uri="{0D108BD9-81ED-4DB2-BD59-A6C34878D82A}">
+                    <a16:rowId xmlns:a16="http://schemas.microsoft.com/office/drawing/2014/main" val="10006"/>
+                  </a:ext>
+                </a:extLst>
+              </a:tr>
+              <a:tr h="153141">
+                <a:tc>
+                  <a:txBody>
+                    <a:bodyPr/>
+                    <a:lstStyle/>
+                    <a:p>
+                      <a:pPr algn="ctr"/>
+                      <a:r>
+                        <a:rPr lang="de-DE" sz="600" dirty="0"/>
+                        <a:t>10</a:t>
+                      </a:r>
                     </a:p>
                   </a:txBody>
                   <a:tcPr marL="36000" marR="36000" marT="36000" marB="36000" anchor="ctr">
@@ -5163,6 +5180,11 @@
                     </a:solidFill>
                   </a:tcPr>
                 </a:tc>
+                <a:extLst>
+                  <a:ext uri="{0D108BD9-81ED-4DB2-BD59-A6C34878D82A}">
+                    <a16:rowId xmlns:a16="http://schemas.microsoft.com/office/drawing/2014/main" val="10007"/>
+                  </a:ext>
+                </a:extLst>
               </a:tr>
             </a:tbl>
           </a:graphicData>
@@ -5176,8 +5198,8 @@
         </p:nvSpPr>
         <p:spPr>
           <a:xfrm rot="16200000">
-            <a:off x="-698947" y="5664511"/>
-            <a:ext cx="1915396" cy="369332"/>
+            <a:off x="-1415437" y="4988886"/>
+            <a:ext cx="3332451" cy="369332"/>
           </a:xfrm>
           <a:prstGeom prst="rect">
             <a:avLst/>
@@ -5191,10 +5213,9 @@
           <a:lstStyle/>
           <a:p>
             <a:r>
-              <a:rPr lang="de-DE" dirty="0" smtClean="0"/>
-              <a:t>CIRCUIT DIAGRAM</a:t>
+              <a:rPr lang="de-DE" dirty="0"/>
+              <a:t>CIRCUIT DIAGRAM Shelly Plus Uni</a:t>
             </a:r>
-            <a:endParaRPr lang="de-DE" dirty="0"/>
           </a:p>
         </p:txBody>
       </p:sp>
@@ -5202,6 +5223,2620 @@
     <p:extLst>
       <p:ext uri="{BB962C8B-B14F-4D97-AF65-F5344CB8AC3E}">
         <p14:creationId xmlns:p14="http://schemas.microsoft.com/office/powerpoint/2010/main" val="3428190991"/>
+      </p:ext>
+    </p:extLst>
+  </p:cSld>
+  <p:clrMapOvr>
+    <a:masterClrMapping/>
+  </p:clrMapOvr>
+</p:sld>
+</file>
+
+<file path=ppt/slides/slide2.xml><?xml version="1.0" encoding="utf-8"?>
+<p:sld xmlns:a="http://schemas.openxmlformats.org/drawingml/2006/main" xmlns:r="http://schemas.openxmlformats.org/officeDocument/2006/relationships" xmlns:p="http://schemas.openxmlformats.org/presentationml/2006/main">
+  <p:cSld>
+    <p:spTree>
+      <p:nvGrpSpPr>
+        <p:cNvPr id="1" name="">
+          <a:extLst>
+            <a:ext uri="{FF2B5EF4-FFF2-40B4-BE49-F238E27FC236}">
+              <a16:creationId xmlns:a16="http://schemas.microsoft.com/office/drawing/2014/main" id="{1834D79A-3DA0-1297-E03B-C02608788253}"/>
+            </a:ext>
+          </a:extLst>
+        </p:cNvPr>
+        <p:cNvGrpSpPr/>
+        <p:nvPr/>
+      </p:nvGrpSpPr>
+      <p:grpSpPr>
+        <a:xfrm>
+          <a:off x="0" y="0"/>
+          <a:ext cx="0" cy="0"/>
+          <a:chOff x="0" y="0"/>
+          <a:chExt cx="0" cy="0"/>
+        </a:xfrm>
+      </p:grpSpPr>
+      <p:grpSp>
+        <p:nvGrpSpPr>
+          <p:cNvPr id="90" name="Gruppieren 89">
+            <a:extLst>
+              <a:ext uri="{FF2B5EF4-FFF2-40B4-BE49-F238E27FC236}">
+                <a16:creationId xmlns:a16="http://schemas.microsoft.com/office/drawing/2014/main" id="{1D4E3B01-ACD4-FCE2-DDDE-5E2B645298D5}"/>
+              </a:ext>
+            </a:extLst>
+          </p:cNvPr>
+          <p:cNvGrpSpPr/>
+          <p:nvPr/>
+        </p:nvGrpSpPr>
+        <p:grpSpPr>
+          <a:xfrm>
+            <a:off x="5063674" y="4099891"/>
+            <a:ext cx="2635828" cy="1540566"/>
+            <a:chOff x="6260192" y="3965713"/>
+            <a:chExt cx="2635828" cy="1540566"/>
+          </a:xfrm>
+        </p:grpSpPr>
+        <p:sp>
+          <p:nvSpPr>
+            <p:cNvPr id="4" name="Abgerundetes Rechteck 3">
+              <a:extLst>
+                <a:ext uri="{FF2B5EF4-FFF2-40B4-BE49-F238E27FC236}">
+                  <a16:creationId xmlns:a16="http://schemas.microsoft.com/office/drawing/2014/main" id="{15A6EDE7-310D-9952-199F-39FD81D54DBC}"/>
+                </a:ext>
+              </a:extLst>
+            </p:cNvPr>
+            <p:cNvSpPr/>
+            <p:nvPr/>
+          </p:nvSpPr>
+          <p:spPr>
+            <a:xfrm>
+              <a:off x="6260192" y="3965713"/>
+              <a:ext cx="2635828" cy="1540566"/>
+            </a:xfrm>
+            <a:prstGeom prst="roundRect">
+              <a:avLst>
+                <a:gd name="adj" fmla="val 10530"/>
+              </a:avLst>
+            </a:prstGeom>
+          </p:spPr>
+          <p:style>
+            <a:lnRef idx="2">
+              <a:schemeClr val="dk1"/>
+            </a:lnRef>
+            <a:fillRef idx="1">
+              <a:schemeClr val="lt1"/>
+            </a:fillRef>
+            <a:effectRef idx="0">
+              <a:schemeClr val="dk1"/>
+            </a:effectRef>
+            <a:fontRef idx="minor">
+              <a:schemeClr val="dk1"/>
+            </a:fontRef>
+          </p:style>
+          <p:txBody>
+            <a:bodyPr rtlCol="0" anchor="ctr"/>
+            <a:lstStyle/>
+            <a:p>
+              <a:pPr algn="ctr"/>
+              <a:endParaRPr lang="de-DE" sz="1400" dirty="0"/>
+            </a:p>
+          </p:txBody>
+        </p:sp>
+        <p:sp>
+          <p:nvSpPr>
+            <p:cNvPr id="5" name="Textfeld 4">
+              <a:extLst>
+                <a:ext uri="{FF2B5EF4-FFF2-40B4-BE49-F238E27FC236}">
+                  <a16:creationId xmlns:a16="http://schemas.microsoft.com/office/drawing/2014/main" id="{12F18BD4-703C-A22B-CA29-DB39EC6574D4}"/>
+                </a:ext>
+              </a:extLst>
+            </p:cNvPr>
+            <p:cNvSpPr txBox="1"/>
+            <p:nvPr/>
+          </p:nvSpPr>
+          <p:spPr>
+            <a:xfrm>
+              <a:off x="6439094" y="4009715"/>
+              <a:ext cx="1032655" cy="1446550"/>
+            </a:xfrm>
+            <a:prstGeom prst="rect">
+              <a:avLst/>
+            </a:prstGeom>
+            <a:noFill/>
+          </p:spPr>
+          <p:txBody>
+            <a:bodyPr wrap="none" rtlCol="0">
+              <a:spAutoFit/>
+            </a:bodyPr>
+            <a:lstStyle/>
+            <a:p>
+              <a:r>
+                <a:rPr lang="de-DE" sz="1100" dirty="0"/>
+                <a:t>VCC</a:t>
+              </a:r>
+            </a:p>
+            <a:p>
+              <a:r>
+                <a:rPr lang="de-DE" sz="1100" dirty="0"/>
+                <a:t>GND</a:t>
+              </a:r>
+            </a:p>
+            <a:p>
+              <a:r>
+                <a:rPr lang="de-DE" sz="1100" dirty="0"/>
+                <a:t>ADC_IN </a:t>
+              </a:r>
+            </a:p>
+            <a:p>
+              <a:r>
+                <a:rPr lang="de-DE" sz="1100" dirty="0"/>
+                <a:t>VCC_SENSOR</a:t>
+              </a:r>
+            </a:p>
+            <a:p>
+              <a:r>
+                <a:rPr lang="de-DE" sz="1100" dirty="0"/>
+                <a:t>DATA_SENSOR</a:t>
+              </a:r>
+            </a:p>
+            <a:p>
+              <a:r>
+                <a:rPr lang="de-DE" sz="1100" dirty="0"/>
+                <a:t>GND_SENSOR</a:t>
+              </a:r>
+            </a:p>
+            <a:p>
+              <a:r>
+                <a:rPr lang="de-DE" sz="1100" dirty="0"/>
+                <a:t>IN_1</a:t>
+              </a:r>
+            </a:p>
+            <a:p>
+              <a:r>
+                <a:rPr lang="de-DE" sz="1100" dirty="0"/>
+                <a:t>IN_2</a:t>
+              </a:r>
+            </a:p>
+          </p:txBody>
+        </p:sp>
+        <p:sp>
+          <p:nvSpPr>
+            <p:cNvPr id="6" name="Textfeld 5">
+              <a:extLst>
+                <a:ext uri="{FF2B5EF4-FFF2-40B4-BE49-F238E27FC236}">
+                  <a16:creationId xmlns:a16="http://schemas.microsoft.com/office/drawing/2014/main" id="{F2BEC18E-A729-EE95-7655-5910C0D871EA}"/>
+                </a:ext>
+              </a:extLst>
+            </p:cNvPr>
+            <p:cNvSpPr txBox="1"/>
+            <p:nvPr/>
+          </p:nvSpPr>
+          <p:spPr>
+            <a:xfrm>
+              <a:off x="8219168" y="4019654"/>
+              <a:ext cx="676852" cy="1438855"/>
+            </a:xfrm>
+            <a:prstGeom prst="rect">
+              <a:avLst/>
+            </a:prstGeom>
+            <a:noFill/>
+          </p:spPr>
+          <p:txBody>
+            <a:bodyPr wrap="none" rtlCol="0">
+              <a:spAutoFit/>
+            </a:bodyPr>
+            <a:lstStyle/>
+            <a:p>
+              <a:pPr algn="r"/>
+              <a:r>
+                <a:rPr lang="de-DE" sz="1250" dirty="0"/>
+                <a:t>Out 1 A</a:t>
+              </a:r>
+            </a:p>
+            <a:p>
+              <a:pPr algn="r"/>
+              <a:endParaRPr lang="de-DE" sz="1250" dirty="0"/>
+            </a:p>
+            <a:p>
+              <a:pPr algn="r"/>
+              <a:r>
+                <a:rPr lang="de-DE" sz="1250" dirty="0"/>
+                <a:t>Out 1 B</a:t>
+              </a:r>
+            </a:p>
+            <a:p>
+              <a:pPr algn="r"/>
+              <a:endParaRPr lang="de-DE" sz="1250" dirty="0"/>
+            </a:p>
+            <a:p>
+              <a:pPr algn="r"/>
+              <a:r>
+                <a:rPr lang="de-DE" sz="1250" dirty="0"/>
+                <a:t>Out 2 A</a:t>
+              </a:r>
+            </a:p>
+            <a:p>
+              <a:pPr algn="r"/>
+              <a:endParaRPr lang="de-DE" sz="1250" dirty="0"/>
+            </a:p>
+            <a:p>
+              <a:pPr algn="r"/>
+              <a:r>
+                <a:rPr lang="de-DE" sz="1250" dirty="0"/>
+                <a:t>Out 2 B</a:t>
+              </a:r>
+            </a:p>
+          </p:txBody>
+        </p:sp>
+        <p:sp>
+          <p:nvSpPr>
+            <p:cNvPr id="7" name="Textfeld 6">
+              <a:extLst>
+                <a:ext uri="{FF2B5EF4-FFF2-40B4-BE49-F238E27FC236}">
+                  <a16:creationId xmlns:a16="http://schemas.microsoft.com/office/drawing/2014/main" id="{024EF2CA-3563-8737-E7B8-D6E89A4C1F7C}"/>
+                </a:ext>
+              </a:extLst>
+            </p:cNvPr>
+            <p:cNvSpPr txBox="1"/>
+            <p:nvPr/>
+          </p:nvSpPr>
+          <p:spPr>
+            <a:xfrm rot="16200000">
+              <a:off x="7582947" y="4596736"/>
+              <a:ext cx="931665" cy="307777"/>
+            </a:xfrm>
+            <a:prstGeom prst="rect">
+              <a:avLst/>
+            </a:prstGeom>
+            <a:noFill/>
+          </p:spPr>
+          <p:txBody>
+            <a:bodyPr wrap="none" rtlCol="0">
+              <a:spAutoFit/>
+            </a:bodyPr>
+            <a:lstStyle/>
+            <a:p>
+              <a:r>
+                <a:rPr lang="de-DE" sz="1400" dirty="0"/>
+                <a:t>Shelly UNI</a:t>
+              </a:r>
+            </a:p>
+          </p:txBody>
+        </p:sp>
+      </p:grpSp>
+      <p:cxnSp>
+        <p:nvCxnSpPr>
+          <p:cNvPr id="15" name="Gerader Verbinder 14">
+            <a:extLst>
+              <a:ext uri="{FF2B5EF4-FFF2-40B4-BE49-F238E27FC236}">
+                <a16:creationId xmlns:a16="http://schemas.microsoft.com/office/drawing/2014/main" id="{FE8C83FA-1BDD-FD3F-B5B3-C3D8EE978644}"/>
+              </a:ext>
+            </a:extLst>
+          </p:cNvPr>
+          <p:cNvCxnSpPr/>
+          <p:nvPr/>
+        </p:nvCxnSpPr>
+        <p:spPr>
+          <a:xfrm flipH="1">
+            <a:off x="2399381" y="4461909"/>
+            <a:ext cx="2664293" cy="0"/>
+          </a:xfrm>
+          <a:prstGeom prst="line">
+            <a:avLst/>
+          </a:prstGeom>
+          <a:ln w="28575">
+            <a:solidFill>
+              <a:schemeClr val="tx1"/>
+            </a:solidFill>
+          </a:ln>
+        </p:spPr>
+        <p:style>
+          <a:lnRef idx="1">
+            <a:schemeClr val="accent1"/>
+          </a:lnRef>
+          <a:fillRef idx="0">
+            <a:schemeClr val="accent1"/>
+          </a:fillRef>
+          <a:effectRef idx="0">
+            <a:schemeClr val="accent1"/>
+          </a:effectRef>
+          <a:fontRef idx="minor">
+            <a:schemeClr val="tx1"/>
+          </a:fontRef>
+        </p:style>
+      </p:cxnSp>
+      <p:cxnSp>
+        <p:nvCxnSpPr>
+          <p:cNvPr id="35" name="Gerader Verbinder 34">
+            <a:extLst>
+              <a:ext uri="{FF2B5EF4-FFF2-40B4-BE49-F238E27FC236}">
+                <a16:creationId xmlns:a16="http://schemas.microsoft.com/office/drawing/2014/main" id="{BBD65D74-C950-1200-F538-A40279229412}"/>
+              </a:ext>
+            </a:extLst>
+          </p:cNvPr>
+          <p:cNvCxnSpPr/>
+          <p:nvPr/>
+        </p:nvCxnSpPr>
+        <p:spPr>
+          <a:xfrm flipH="1">
+            <a:off x="2410849" y="393098"/>
+            <a:ext cx="2343" cy="751159"/>
+          </a:xfrm>
+          <a:prstGeom prst="line">
+            <a:avLst/>
+          </a:prstGeom>
+          <a:ln w="28575">
+            <a:solidFill>
+              <a:schemeClr val="tx1"/>
+            </a:solidFill>
+          </a:ln>
+        </p:spPr>
+        <p:style>
+          <a:lnRef idx="1">
+            <a:schemeClr val="accent1"/>
+          </a:lnRef>
+          <a:fillRef idx="0">
+            <a:schemeClr val="accent1"/>
+          </a:fillRef>
+          <a:effectRef idx="0">
+            <a:schemeClr val="accent1"/>
+          </a:effectRef>
+          <a:fontRef idx="minor">
+            <a:schemeClr val="tx1"/>
+          </a:fontRef>
+        </p:style>
+      </p:cxnSp>
+      <p:cxnSp>
+        <p:nvCxnSpPr>
+          <p:cNvPr id="37" name="Gerader Verbinder 36">
+            <a:extLst>
+              <a:ext uri="{FF2B5EF4-FFF2-40B4-BE49-F238E27FC236}">
+                <a16:creationId xmlns:a16="http://schemas.microsoft.com/office/drawing/2014/main" id="{04B93E28-226B-374E-F5DA-CB4D0EC3C2FB}"/>
+              </a:ext>
+            </a:extLst>
+          </p:cNvPr>
+          <p:cNvCxnSpPr/>
+          <p:nvPr/>
+        </p:nvCxnSpPr>
+        <p:spPr>
+          <a:xfrm flipH="1">
+            <a:off x="2866878" y="402673"/>
+            <a:ext cx="2343" cy="751159"/>
+          </a:xfrm>
+          <a:prstGeom prst="line">
+            <a:avLst/>
+          </a:prstGeom>
+          <a:ln w="28575">
+            <a:solidFill>
+              <a:schemeClr val="accent4">
+                <a:lumMod val="75000"/>
+              </a:schemeClr>
+            </a:solidFill>
+          </a:ln>
+        </p:spPr>
+        <p:style>
+          <a:lnRef idx="1">
+            <a:schemeClr val="accent1"/>
+          </a:lnRef>
+          <a:fillRef idx="0">
+            <a:schemeClr val="accent1"/>
+          </a:fillRef>
+          <a:effectRef idx="0">
+            <a:schemeClr val="accent1"/>
+          </a:effectRef>
+          <a:fontRef idx="minor">
+            <a:schemeClr val="tx1"/>
+          </a:fontRef>
+        </p:style>
+      </p:cxnSp>
+      <p:cxnSp>
+        <p:nvCxnSpPr>
+          <p:cNvPr id="38" name="Gerader Verbinder 37">
+            <a:extLst>
+              <a:ext uri="{FF2B5EF4-FFF2-40B4-BE49-F238E27FC236}">
+                <a16:creationId xmlns:a16="http://schemas.microsoft.com/office/drawing/2014/main" id="{DD69953A-CAD7-EF37-0E2B-DDB2ED3DBBA5}"/>
+              </a:ext>
+            </a:extLst>
+          </p:cNvPr>
+          <p:cNvCxnSpPr/>
+          <p:nvPr/>
+        </p:nvCxnSpPr>
+        <p:spPr>
+          <a:xfrm>
+            <a:off x="2866880" y="2522389"/>
+            <a:ext cx="5825" cy="1776172"/>
+          </a:xfrm>
+          <a:prstGeom prst="line">
+            <a:avLst/>
+          </a:prstGeom>
+          <a:ln w="28575">
+            <a:solidFill>
+              <a:srgbClr val="FF0000"/>
+            </a:solidFill>
+          </a:ln>
+        </p:spPr>
+        <p:style>
+          <a:lnRef idx="1">
+            <a:schemeClr val="accent1"/>
+          </a:lnRef>
+          <a:fillRef idx="0">
+            <a:schemeClr val="accent1"/>
+          </a:fillRef>
+          <a:effectRef idx="0">
+            <a:schemeClr val="accent1"/>
+          </a:effectRef>
+          <a:fontRef idx="minor">
+            <a:schemeClr val="tx1"/>
+          </a:fontRef>
+        </p:style>
+      </p:cxnSp>
+      <p:grpSp>
+        <p:nvGrpSpPr>
+          <p:cNvPr id="59" name="Gruppieren 58">
+            <a:extLst>
+              <a:ext uri="{FF2B5EF4-FFF2-40B4-BE49-F238E27FC236}">
+                <a16:creationId xmlns:a16="http://schemas.microsoft.com/office/drawing/2014/main" id="{831C106D-304B-3017-B7E7-9F01DB5D6404}"/>
+              </a:ext>
+            </a:extLst>
+          </p:cNvPr>
+          <p:cNvGrpSpPr/>
+          <p:nvPr/>
+        </p:nvGrpSpPr>
+        <p:grpSpPr>
+          <a:xfrm>
+            <a:off x="5697258" y="1181660"/>
+            <a:ext cx="984739" cy="1378634"/>
+            <a:chOff x="6838049" y="1131751"/>
+            <a:chExt cx="984739" cy="1378634"/>
+          </a:xfrm>
+        </p:grpSpPr>
+        <p:sp>
+          <p:nvSpPr>
+            <p:cNvPr id="39" name="Rechteck 38">
+              <a:extLst>
+                <a:ext uri="{FF2B5EF4-FFF2-40B4-BE49-F238E27FC236}">
+                  <a16:creationId xmlns:a16="http://schemas.microsoft.com/office/drawing/2014/main" id="{752DF49E-B844-7134-7476-277B36BE7917}"/>
+                </a:ext>
+              </a:extLst>
+            </p:cNvPr>
+            <p:cNvSpPr/>
+            <p:nvPr/>
+          </p:nvSpPr>
+          <p:spPr>
+            <a:xfrm>
+              <a:off x="6838049" y="1131751"/>
+              <a:ext cx="984739" cy="1378634"/>
+            </a:xfrm>
+            <a:prstGeom prst="rect">
+              <a:avLst/>
+            </a:prstGeom>
+          </p:spPr>
+          <p:style>
+            <a:lnRef idx="2">
+              <a:schemeClr val="dk1"/>
+            </a:lnRef>
+            <a:fillRef idx="1">
+              <a:schemeClr val="lt1"/>
+            </a:fillRef>
+            <a:effectRef idx="0">
+              <a:schemeClr val="dk1"/>
+            </a:effectRef>
+            <a:fontRef idx="minor">
+              <a:schemeClr val="dk1"/>
+            </a:fontRef>
+          </p:style>
+          <p:txBody>
+            <a:bodyPr rtlCol="0" anchor="ctr"/>
+            <a:lstStyle/>
+            <a:p>
+              <a:pPr algn="ctr"/>
+              <a:endParaRPr lang="de-DE"/>
+            </a:p>
+          </p:txBody>
+        </p:sp>
+        <p:grpSp>
+          <p:nvGrpSpPr>
+            <p:cNvPr id="55" name="Gruppieren 54">
+              <a:extLst>
+                <a:ext uri="{FF2B5EF4-FFF2-40B4-BE49-F238E27FC236}">
+                  <a16:creationId xmlns:a16="http://schemas.microsoft.com/office/drawing/2014/main" id="{37D50A01-C4B2-FC39-89D8-433869B12E0F}"/>
+                </a:ext>
+              </a:extLst>
+            </p:cNvPr>
+            <p:cNvGrpSpPr/>
+            <p:nvPr/>
+          </p:nvGrpSpPr>
+          <p:grpSpPr>
+            <a:xfrm>
+              <a:off x="7023903" y="1361531"/>
+              <a:ext cx="613029" cy="383157"/>
+              <a:chOff x="3349336" y="2499265"/>
+              <a:chExt cx="613029" cy="383157"/>
+            </a:xfrm>
+          </p:grpSpPr>
+          <p:cxnSp>
+            <p:nvCxnSpPr>
+              <p:cNvPr id="46" name="Gerader Verbinder 45">
+                <a:extLst>
+                  <a:ext uri="{FF2B5EF4-FFF2-40B4-BE49-F238E27FC236}">
+                    <a16:creationId xmlns:a16="http://schemas.microsoft.com/office/drawing/2014/main" id="{1A198EF1-3AA4-79DE-29FE-54D1898E92FD}"/>
+                  </a:ext>
+                </a:extLst>
+              </p:cNvPr>
+              <p:cNvCxnSpPr/>
+              <p:nvPr/>
+            </p:nvCxnSpPr>
+            <p:spPr>
+              <a:xfrm flipH="1">
+                <a:off x="3349336" y="2853836"/>
+                <a:ext cx="199292" cy="1733"/>
+              </a:xfrm>
+              <a:prstGeom prst="line">
+                <a:avLst/>
+              </a:prstGeom>
+              <a:ln w="28575">
+                <a:solidFill>
+                  <a:schemeClr val="tx1"/>
+                </a:solidFill>
+              </a:ln>
+            </p:spPr>
+            <p:style>
+              <a:lnRef idx="1">
+                <a:schemeClr val="accent1"/>
+              </a:lnRef>
+              <a:fillRef idx="0">
+                <a:schemeClr val="accent1"/>
+              </a:fillRef>
+              <a:effectRef idx="0">
+                <a:schemeClr val="accent1"/>
+              </a:effectRef>
+              <a:fontRef idx="minor">
+                <a:schemeClr val="tx1"/>
+              </a:fontRef>
+            </p:style>
+          </p:cxnSp>
+          <p:cxnSp>
+            <p:nvCxnSpPr>
+              <p:cNvPr id="48" name="Gerader Verbinder 47">
+                <a:extLst>
+                  <a:ext uri="{FF2B5EF4-FFF2-40B4-BE49-F238E27FC236}">
+                    <a16:creationId xmlns:a16="http://schemas.microsoft.com/office/drawing/2014/main" id="{941B288E-93CA-51F8-B905-0A70D5DDD091}"/>
+                  </a:ext>
+                </a:extLst>
+              </p:cNvPr>
+              <p:cNvCxnSpPr/>
+              <p:nvPr/>
+            </p:nvCxnSpPr>
+            <p:spPr>
+              <a:xfrm flipH="1">
+                <a:off x="3763073" y="2851491"/>
+                <a:ext cx="199292" cy="1733"/>
+              </a:xfrm>
+              <a:prstGeom prst="line">
+                <a:avLst/>
+              </a:prstGeom>
+              <a:ln w="28575">
+                <a:solidFill>
+                  <a:schemeClr val="tx1"/>
+                </a:solidFill>
+              </a:ln>
+            </p:spPr>
+            <p:style>
+              <a:lnRef idx="1">
+                <a:schemeClr val="accent1"/>
+              </a:lnRef>
+              <a:fillRef idx="0">
+                <a:schemeClr val="accent1"/>
+              </a:fillRef>
+              <a:effectRef idx="0">
+                <a:schemeClr val="accent1"/>
+              </a:effectRef>
+              <a:fontRef idx="minor">
+                <a:schemeClr val="tx1"/>
+              </a:fontRef>
+            </p:style>
+          </p:cxnSp>
+          <p:cxnSp>
+            <p:nvCxnSpPr>
+              <p:cNvPr id="49" name="Gerader Verbinder 48">
+                <a:extLst>
+                  <a:ext uri="{FF2B5EF4-FFF2-40B4-BE49-F238E27FC236}">
+                    <a16:creationId xmlns:a16="http://schemas.microsoft.com/office/drawing/2014/main" id="{F9BC6D10-27B2-CEE9-790A-4656CDA13C7C}"/>
+                  </a:ext>
+                </a:extLst>
+              </p:cNvPr>
+              <p:cNvCxnSpPr/>
+              <p:nvPr/>
+            </p:nvCxnSpPr>
+            <p:spPr>
+              <a:xfrm flipH="1">
+                <a:off x="3509889" y="2751135"/>
+                <a:ext cx="298938" cy="0"/>
+              </a:xfrm>
+              <a:prstGeom prst="line">
+                <a:avLst/>
+              </a:prstGeom>
+              <a:ln w="28575">
+                <a:solidFill>
+                  <a:schemeClr val="tx1"/>
+                </a:solidFill>
+              </a:ln>
+            </p:spPr>
+            <p:style>
+              <a:lnRef idx="1">
+                <a:schemeClr val="accent1"/>
+              </a:lnRef>
+              <a:fillRef idx="0">
+                <a:schemeClr val="accent1"/>
+              </a:fillRef>
+              <a:effectRef idx="0">
+                <a:schemeClr val="accent1"/>
+              </a:effectRef>
+              <a:fontRef idx="minor">
+                <a:schemeClr val="tx1"/>
+              </a:fontRef>
+            </p:style>
+          </p:cxnSp>
+          <p:cxnSp>
+            <p:nvCxnSpPr>
+              <p:cNvPr id="51" name="Gerader Verbinder 50">
+                <a:extLst>
+                  <a:ext uri="{FF2B5EF4-FFF2-40B4-BE49-F238E27FC236}">
+                    <a16:creationId xmlns:a16="http://schemas.microsoft.com/office/drawing/2014/main" id="{95B41EAF-E5F0-2614-8C07-73BE89D7353A}"/>
+                  </a:ext>
+                </a:extLst>
+              </p:cNvPr>
+              <p:cNvCxnSpPr/>
+              <p:nvPr/>
+            </p:nvCxnSpPr>
+            <p:spPr>
+              <a:xfrm>
+                <a:off x="3659358" y="2499265"/>
+                <a:ext cx="2931" cy="263590"/>
+              </a:xfrm>
+              <a:prstGeom prst="line">
+                <a:avLst/>
+              </a:prstGeom>
+              <a:ln w="28575">
+                <a:solidFill>
+                  <a:schemeClr val="tx1"/>
+                </a:solidFill>
+              </a:ln>
+            </p:spPr>
+            <p:style>
+              <a:lnRef idx="1">
+                <a:schemeClr val="accent1"/>
+              </a:lnRef>
+              <a:fillRef idx="0">
+                <a:schemeClr val="accent1"/>
+              </a:fillRef>
+              <a:effectRef idx="0">
+                <a:schemeClr val="accent1"/>
+              </a:effectRef>
+              <a:fontRef idx="minor">
+                <a:schemeClr val="tx1"/>
+              </a:fontRef>
+            </p:style>
+          </p:cxnSp>
+          <p:sp>
+            <p:nvSpPr>
+              <p:cNvPr id="53" name="Ellipse 52">
+                <a:extLst>
+                  <a:ext uri="{FF2B5EF4-FFF2-40B4-BE49-F238E27FC236}">
+                    <a16:creationId xmlns:a16="http://schemas.microsoft.com/office/drawing/2014/main" id="{84BAF27F-3C34-BF24-0128-159DC9BE8F24}"/>
+                  </a:ext>
+                </a:extLst>
+              </p:cNvPr>
+              <p:cNvSpPr/>
+              <p:nvPr/>
+            </p:nvSpPr>
+            <p:spPr>
+              <a:xfrm>
+                <a:off x="3763073" y="2826918"/>
+                <a:ext cx="45754" cy="51204"/>
+              </a:xfrm>
+              <a:prstGeom prst="ellipse">
+                <a:avLst/>
+              </a:prstGeom>
+            </p:spPr>
+            <p:style>
+              <a:lnRef idx="2">
+                <a:schemeClr val="dk1">
+                  <a:shade val="50000"/>
+                </a:schemeClr>
+              </a:lnRef>
+              <a:fillRef idx="1">
+                <a:schemeClr val="dk1"/>
+              </a:fillRef>
+              <a:effectRef idx="0">
+                <a:schemeClr val="dk1"/>
+              </a:effectRef>
+              <a:fontRef idx="minor">
+                <a:schemeClr val="lt1"/>
+              </a:fontRef>
+            </p:style>
+            <p:txBody>
+              <a:bodyPr rtlCol="0" anchor="ctr"/>
+              <a:lstStyle/>
+              <a:p>
+                <a:pPr algn="ctr"/>
+                <a:endParaRPr lang="de-DE"/>
+              </a:p>
+            </p:txBody>
+          </p:sp>
+          <p:sp>
+            <p:nvSpPr>
+              <p:cNvPr id="54" name="Ellipse 53">
+                <a:extLst>
+                  <a:ext uri="{FF2B5EF4-FFF2-40B4-BE49-F238E27FC236}">
+                    <a16:creationId xmlns:a16="http://schemas.microsoft.com/office/drawing/2014/main" id="{273DE589-A04A-0C70-8688-1749C7BD7FC2}"/>
+                  </a:ext>
+                </a:extLst>
+              </p:cNvPr>
+              <p:cNvSpPr/>
+              <p:nvPr/>
+            </p:nvSpPr>
+            <p:spPr>
+              <a:xfrm>
+                <a:off x="3503350" y="2831218"/>
+                <a:ext cx="45754" cy="51204"/>
+              </a:xfrm>
+              <a:prstGeom prst="ellipse">
+                <a:avLst/>
+              </a:prstGeom>
+            </p:spPr>
+            <p:style>
+              <a:lnRef idx="2">
+                <a:schemeClr val="dk1">
+                  <a:shade val="50000"/>
+                </a:schemeClr>
+              </a:lnRef>
+              <a:fillRef idx="1">
+                <a:schemeClr val="dk1"/>
+              </a:fillRef>
+              <a:effectRef idx="0">
+                <a:schemeClr val="dk1"/>
+              </a:effectRef>
+              <a:fontRef idx="minor">
+                <a:schemeClr val="lt1"/>
+              </a:fontRef>
+            </p:style>
+            <p:txBody>
+              <a:bodyPr rtlCol="0" anchor="ctr"/>
+              <a:lstStyle/>
+              <a:p>
+                <a:pPr algn="ctr"/>
+                <a:endParaRPr lang="de-DE"/>
+              </a:p>
+            </p:txBody>
+          </p:sp>
+        </p:grpSp>
+        <p:sp>
+          <p:nvSpPr>
+            <p:cNvPr id="56" name="Rechteck 55">
+              <a:extLst>
+                <a:ext uri="{FF2B5EF4-FFF2-40B4-BE49-F238E27FC236}">
+                  <a16:creationId xmlns:a16="http://schemas.microsoft.com/office/drawing/2014/main" id="{F70C14B6-9410-A5D3-0ED3-5DF4B6D2716D}"/>
+                </a:ext>
+              </a:extLst>
+            </p:cNvPr>
+            <p:cNvSpPr/>
+            <p:nvPr/>
+          </p:nvSpPr>
+          <p:spPr>
+            <a:xfrm>
+              <a:off x="6864034" y="1984540"/>
+              <a:ext cx="945643" cy="461665"/>
+            </a:xfrm>
+            <a:prstGeom prst="rect">
+              <a:avLst/>
+            </a:prstGeom>
+          </p:spPr>
+          <p:txBody>
+            <a:bodyPr wrap="none">
+              <a:spAutoFit/>
+            </a:bodyPr>
+            <a:lstStyle/>
+            <a:p>
+              <a:pPr algn="ctr"/>
+              <a:r>
+                <a:rPr lang="de-DE" sz="1200" dirty="0"/>
+                <a:t>Doorbell </a:t>
+              </a:r>
+            </a:p>
+            <a:p>
+              <a:pPr algn="ctr"/>
+              <a:r>
+                <a:rPr lang="de-DE" sz="1200" dirty="0"/>
+                <a:t>Push Button</a:t>
+              </a:r>
+            </a:p>
+          </p:txBody>
+        </p:sp>
+      </p:grpSp>
+      <p:grpSp>
+        <p:nvGrpSpPr>
+          <p:cNvPr id="58" name="Gruppieren 57">
+            <a:extLst>
+              <a:ext uri="{FF2B5EF4-FFF2-40B4-BE49-F238E27FC236}">
+                <a16:creationId xmlns:a16="http://schemas.microsoft.com/office/drawing/2014/main" id="{D5FCE6EF-82E8-B487-203D-5124D9FAD668}"/>
+              </a:ext>
+            </a:extLst>
+          </p:cNvPr>
+          <p:cNvGrpSpPr/>
+          <p:nvPr/>
+        </p:nvGrpSpPr>
+        <p:grpSpPr>
+          <a:xfrm>
+            <a:off x="8910826" y="1194699"/>
+            <a:ext cx="984739" cy="1378634"/>
+            <a:chOff x="8212865" y="1258360"/>
+            <a:chExt cx="984739" cy="1378634"/>
+          </a:xfrm>
+        </p:grpSpPr>
+        <p:sp>
+          <p:nvSpPr>
+            <p:cNvPr id="27" name="Rechteck 26">
+              <a:extLst>
+                <a:ext uri="{FF2B5EF4-FFF2-40B4-BE49-F238E27FC236}">
+                  <a16:creationId xmlns:a16="http://schemas.microsoft.com/office/drawing/2014/main" id="{174D5E94-3A93-B03B-E6FD-633ACF60DEA3}"/>
+                </a:ext>
+              </a:extLst>
+            </p:cNvPr>
+            <p:cNvSpPr/>
+            <p:nvPr/>
+          </p:nvSpPr>
+          <p:spPr>
+            <a:xfrm>
+              <a:off x="8212865" y="1258360"/>
+              <a:ext cx="984739" cy="1378634"/>
+            </a:xfrm>
+            <a:prstGeom prst="rect">
+              <a:avLst/>
+            </a:prstGeom>
+          </p:spPr>
+          <p:style>
+            <a:lnRef idx="2">
+              <a:schemeClr val="dk1"/>
+            </a:lnRef>
+            <a:fillRef idx="1">
+              <a:schemeClr val="lt1"/>
+            </a:fillRef>
+            <a:effectRef idx="0">
+              <a:schemeClr val="dk1"/>
+            </a:effectRef>
+            <a:fontRef idx="minor">
+              <a:schemeClr val="dk1"/>
+            </a:fontRef>
+          </p:style>
+          <p:txBody>
+            <a:bodyPr rtlCol="0" anchor="ctr"/>
+            <a:lstStyle/>
+            <a:p>
+              <a:pPr algn="ctr"/>
+              <a:endParaRPr lang="de-DE"/>
+            </a:p>
+          </p:txBody>
+        </p:sp>
+        <p:grpSp>
+          <p:nvGrpSpPr>
+            <p:cNvPr id="26" name="Gruppieren 25">
+              <a:extLst>
+                <a:ext uri="{FF2B5EF4-FFF2-40B4-BE49-F238E27FC236}">
+                  <a16:creationId xmlns:a16="http://schemas.microsoft.com/office/drawing/2014/main" id="{FEC9619F-AFF0-D7FB-F52B-430832465EF9}"/>
+                </a:ext>
+              </a:extLst>
+            </p:cNvPr>
+            <p:cNvGrpSpPr/>
+            <p:nvPr/>
+          </p:nvGrpSpPr>
+          <p:grpSpPr>
+            <a:xfrm>
+              <a:off x="8407207" y="1475627"/>
+              <a:ext cx="594599" cy="474340"/>
+              <a:chOff x="4079630" y="1252024"/>
+              <a:chExt cx="879231" cy="759660"/>
+            </a:xfrm>
+          </p:grpSpPr>
+          <p:sp>
+            <p:nvSpPr>
+              <p:cNvPr id="16" name="Flussdiagramm: Verzögerung 15">
+                <a:extLst>
+                  <a:ext uri="{FF2B5EF4-FFF2-40B4-BE49-F238E27FC236}">
+                    <a16:creationId xmlns:a16="http://schemas.microsoft.com/office/drawing/2014/main" id="{708B50AC-2DD3-7710-D909-37E498C85991}"/>
+                  </a:ext>
+                </a:extLst>
+              </p:cNvPr>
+              <p:cNvSpPr/>
+              <p:nvPr/>
+            </p:nvSpPr>
+            <p:spPr>
+              <a:xfrm rot="16200000">
+                <a:off x="4234375" y="1097279"/>
+                <a:ext cx="569741" cy="879231"/>
+              </a:xfrm>
+              <a:prstGeom prst="flowChartDelay">
+                <a:avLst/>
+              </a:prstGeom>
+              <a:ln w="28575"/>
+            </p:spPr>
+            <p:style>
+              <a:lnRef idx="2">
+                <a:schemeClr val="dk1"/>
+              </a:lnRef>
+              <a:fillRef idx="1">
+                <a:schemeClr val="lt1"/>
+              </a:fillRef>
+              <a:effectRef idx="0">
+                <a:schemeClr val="dk1"/>
+              </a:effectRef>
+              <a:fontRef idx="minor">
+                <a:schemeClr val="dk1"/>
+              </a:fontRef>
+            </p:style>
+            <p:txBody>
+              <a:bodyPr rtlCol="0" anchor="ctr"/>
+              <a:lstStyle/>
+              <a:p>
+                <a:pPr algn="ctr"/>
+                <a:endParaRPr lang="de-DE"/>
+              </a:p>
+            </p:txBody>
+          </p:sp>
+          <p:cxnSp>
+            <p:nvCxnSpPr>
+              <p:cNvPr id="17" name="Gerader Verbinder 16">
+                <a:extLst>
+                  <a:ext uri="{FF2B5EF4-FFF2-40B4-BE49-F238E27FC236}">
+                    <a16:creationId xmlns:a16="http://schemas.microsoft.com/office/drawing/2014/main" id="{822403AC-75CD-A430-D7ED-DEF8AE31D410}"/>
+                  </a:ext>
+                </a:extLst>
+              </p:cNvPr>
+              <p:cNvCxnSpPr/>
+              <p:nvPr/>
+            </p:nvCxnSpPr>
+            <p:spPr>
+              <a:xfrm flipV="1">
+                <a:off x="4797083" y="1828803"/>
+                <a:ext cx="0" cy="182881"/>
+              </a:xfrm>
+              <a:prstGeom prst="line">
+                <a:avLst/>
+              </a:prstGeom>
+              <a:ln w="28575">
+                <a:solidFill>
+                  <a:schemeClr val="tx1"/>
+                </a:solidFill>
+              </a:ln>
+            </p:spPr>
+            <p:style>
+              <a:lnRef idx="1">
+                <a:schemeClr val="accent1"/>
+              </a:lnRef>
+              <a:fillRef idx="0">
+                <a:schemeClr val="accent1"/>
+              </a:fillRef>
+              <a:effectRef idx="0">
+                <a:schemeClr val="accent1"/>
+              </a:effectRef>
+              <a:fontRef idx="minor">
+                <a:schemeClr val="tx1"/>
+              </a:fontRef>
+            </p:style>
+          </p:cxnSp>
+          <p:cxnSp>
+            <p:nvCxnSpPr>
+              <p:cNvPr id="25" name="Gerader Verbinder 24">
+                <a:extLst>
+                  <a:ext uri="{FF2B5EF4-FFF2-40B4-BE49-F238E27FC236}">
+                    <a16:creationId xmlns:a16="http://schemas.microsoft.com/office/drawing/2014/main" id="{239AA57F-9E10-CBB2-ED83-AD65C64EAF55}"/>
+                  </a:ext>
+                </a:extLst>
+              </p:cNvPr>
+              <p:cNvCxnSpPr/>
+              <p:nvPr/>
+            </p:nvCxnSpPr>
+            <p:spPr>
+              <a:xfrm flipV="1">
+                <a:off x="4217963" y="1826458"/>
+                <a:ext cx="0" cy="182881"/>
+              </a:xfrm>
+              <a:prstGeom prst="line">
+                <a:avLst/>
+              </a:prstGeom>
+              <a:ln w="28575">
+                <a:solidFill>
+                  <a:schemeClr val="tx1"/>
+                </a:solidFill>
+              </a:ln>
+            </p:spPr>
+            <p:style>
+              <a:lnRef idx="1">
+                <a:schemeClr val="accent1"/>
+              </a:lnRef>
+              <a:fillRef idx="0">
+                <a:schemeClr val="accent1"/>
+              </a:fillRef>
+              <a:effectRef idx="0">
+                <a:schemeClr val="accent1"/>
+              </a:effectRef>
+              <a:fontRef idx="minor">
+                <a:schemeClr val="tx1"/>
+              </a:fontRef>
+            </p:style>
+          </p:cxnSp>
+        </p:grpSp>
+        <p:sp>
+          <p:nvSpPr>
+            <p:cNvPr id="57" name="Rechteck 56">
+              <a:extLst>
+                <a:ext uri="{FF2B5EF4-FFF2-40B4-BE49-F238E27FC236}">
+                  <a16:creationId xmlns:a16="http://schemas.microsoft.com/office/drawing/2014/main" id="{91C0557D-ED01-9922-C697-B0028FF5CE21}"/>
+                </a:ext>
+              </a:extLst>
+            </p:cNvPr>
+            <p:cNvSpPr/>
+            <p:nvPr/>
+          </p:nvSpPr>
+          <p:spPr>
+            <a:xfrm>
+              <a:off x="8325235" y="2134359"/>
+              <a:ext cx="758541" cy="461665"/>
+            </a:xfrm>
+            <a:prstGeom prst="rect">
+              <a:avLst/>
+            </a:prstGeom>
+          </p:spPr>
+          <p:txBody>
+            <a:bodyPr wrap="none">
+              <a:spAutoFit/>
+            </a:bodyPr>
+            <a:lstStyle/>
+            <a:p>
+              <a:pPr algn="ctr"/>
+              <a:r>
+                <a:rPr lang="de-DE" sz="1200" dirty="0"/>
+                <a:t>Doorbell </a:t>
+              </a:r>
+            </a:p>
+            <a:p>
+              <a:pPr algn="ctr"/>
+              <a:r>
+                <a:rPr lang="de-DE" sz="1200" dirty="0"/>
+                <a:t>Chime</a:t>
+              </a:r>
+            </a:p>
+          </p:txBody>
+        </p:sp>
+      </p:grpSp>
+      <p:grpSp>
+        <p:nvGrpSpPr>
+          <p:cNvPr id="67" name="Gruppieren 66">
+            <a:extLst>
+              <a:ext uri="{FF2B5EF4-FFF2-40B4-BE49-F238E27FC236}">
+                <a16:creationId xmlns:a16="http://schemas.microsoft.com/office/drawing/2014/main" id="{359FC07F-E61E-390B-29F1-DDA2993E9C42}"/>
+              </a:ext>
+            </a:extLst>
+          </p:cNvPr>
+          <p:cNvGrpSpPr/>
+          <p:nvPr/>
+        </p:nvGrpSpPr>
+        <p:grpSpPr>
+          <a:xfrm>
+            <a:off x="2136461" y="1138740"/>
+            <a:ext cx="984739" cy="1378634"/>
+            <a:chOff x="3225342" y="297329"/>
+            <a:chExt cx="984739" cy="1378634"/>
+          </a:xfrm>
+        </p:grpSpPr>
+        <p:sp>
+          <p:nvSpPr>
+            <p:cNvPr id="63" name="Rechteck 62">
+              <a:extLst>
+                <a:ext uri="{FF2B5EF4-FFF2-40B4-BE49-F238E27FC236}">
+                  <a16:creationId xmlns:a16="http://schemas.microsoft.com/office/drawing/2014/main" id="{E28969EF-E100-E9EE-8053-EDE8BFA48D3D}"/>
+                </a:ext>
+              </a:extLst>
+            </p:cNvPr>
+            <p:cNvSpPr/>
+            <p:nvPr/>
+          </p:nvSpPr>
+          <p:spPr>
+            <a:xfrm>
+              <a:off x="3225342" y="297329"/>
+              <a:ext cx="984739" cy="1378634"/>
+            </a:xfrm>
+            <a:prstGeom prst="rect">
+              <a:avLst/>
+            </a:prstGeom>
+          </p:spPr>
+          <p:style>
+            <a:lnRef idx="2">
+              <a:schemeClr val="dk1"/>
+            </a:lnRef>
+            <a:fillRef idx="1">
+              <a:schemeClr val="lt1"/>
+            </a:fillRef>
+            <a:effectRef idx="0">
+              <a:schemeClr val="dk1"/>
+            </a:effectRef>
+            <a:fontRef idx="minor">
+              <a:schemeClr val="dk1"/>
+            </a:fontRef>
+          </p:style>
+          <p:txBody>
+            <a:bodyPr rtlCol="0" anchor="ctr"/>
+            <a:lstStyle/>
+            <a:p>
+              <a:pPr algn="ctr"/>
+              <a:endParaRPr lang="de-DE"/>
+            </a:p>
+          </p:txBody>
+        </p:sp>
+        <p:cxnSp>
+          <p:nvCxnSpPr>
+            <p:cNvPr id="31" name="Gerader Verbinder 30">
+              <a:extLst>
+                <a:ext uri="{FF2B5EF4-FFF2-40B4-BE49-F238E27FC236}">
+                  <a16:creationId xmlns:a16="http://schemas.microsoft.com/office/drawing/2014/main" id="{438E17DC-F859-4F9F-EB34-5CBF18E291AC}"/>
+                </a:ext>
+              </a:extLst>
+            </p:cNvPr>
+            <p:cNvCxnSpPr/>
+            <p:nvPr/>
+          </p:nvCxnSpPr>
+          <p:spPr>
+            <a:xfrm flipV="1">
+              <a:off x="3233351" y="660400"/>
+              <a:ext cx="976730" cy="3064"/>
+            </a:xfrm>
+            <a:prstGeom prst="line">
+              <a:avLst/>
+            </a:prstGeom>
+            <a:ln>
+              <a:solidFill>
+                <a:schemeClr val="tx1"/>
+              </a:solidFill>
+            </a:ln>
+          </p:spPr>
+          <p:style>
+            <a:lnRef idx="1">
+              <a:schemeClr val="accent1"/>
+            </a:lnRef>
+            <a:fillRef idx="0">
+              <a:schemeClr val="accent1"/>
+            </a:fillRef>
+            <a:effectRef idx="0">
+              <a:schemeClr val="accent1"/>
+            </a:effectRef>
+            <a:fontRef idx="minor">
+              <a:schemeClr val="tx1"/>
+            </a:fontRef>
+          </p:style>
+        </p:cxnSp>
+        <p:sp>
+          <p:nvSpPr>
+            <p:cNvPr id="33" name="Textfeld 32">
+              <a:extLst>
+                <a:ext uri="{FF2B5EF4-FFF2-40B4-BE49-F238E27FC236}">
+                  <a16:creationId xmlns:a16="http://schemas.microsoft.com/office/drawing/2014/main" id="{A33DF725-0481-391B-BF7F-EDC7E82A8E0B}"/>
+                </a:ext>
+              </a:extLst>
+            </p:cNvPr>
+            <p:cNvSpPr txBox="1"/>
+            <p:nvPr/>
+          </p:nvSpPr>
+          <p:spPr>
+            <a:xfrm>
+              <a:off x="3350648" y="340249"/>
+              <a:ext cx="781118" cy="276999"/>
+            </a:xfrm>
+            <a:prstGeom prst="rect">
+              <a:avLst/>
+            </a:prstGeom>
+            <a:noFill/>
+          </p:spPr>
+          <p:txBody>
+            <a:bodyPr wrap="square" rtlCol="0">
+              <a:spAutoFit/>
+            </a:bodyPr>
+            <a:lstStyle/>
+            <a:p>
+              <a:pPr algn="ctr"/>
+              <a:r>
+                <a:rPr lang="de-DE" sz="1200" b="1" dirty="0"/>
+                <a:t>230V AC</a:t>
+              </a:r>
+            </a:p>
+          </p:txBody>
+        </p:sp>
+        <p:sp>
+          <p:nvSpPr>
+            <p:cNvPr id="60" name="Rechteck 59">
+              <a:extLst>
+                <a:ext uri="{FF2B5EF4-FFF2-40B4-BE49-F238E27FC236}">
+                  <a16:creationId xmlns:a16="http://schemas.microsoft.com/office/drawing/2014/main" id="{2B6C1E8B-5C77-45AA-720D-CA551EAD4794}"/>
+                </a:ext>
+              </a:extLst>
+            </p:cNvPr>
+            <p:cNvSpPr/>
+            <p:nvPr/>
+          </p:nvSpPr>
+          <p:spPr>
+            <a:xfrm>
+              <a:off x="3245306" y="756021"/>
+              <a:ext cx="944810" cy="461665"/>
+            </a:xfrm>
+            <a:prstGeom prst="rect">
+              <a:avLst/>
+            </a:prstGeom>
+          </p:spPr>
+          <p:txBody>
+            <a:bodyPr wrap="none">
+              <a:spAutoFit/>
+            </a:bodyPr>
+            <a:lstStyle/>
+            <a:p>
+              <a:pPr algn="ctr"/>
+              <a:r>
+                <a:rPr lang="de-DE" sz="1200" dirty="0"/>
+                <a:t>Doorbell </a:t>
+              </a:r>
+            </a:p>
+            <a:p>
+              <a:pPr algn="ctr"/>
+              <a:r>
+                <a:rPr lang="de-DE" sz="1200" dirty="0"/>
+                <a:t>Transformer</a:t>
+              </a:r>
+            </a:p>
+          </p:txBody>
+        </p:sp>
+        <p:cxnSp>
+          <p:nvCxnSpPr>
+            <p:cNvPr id="65" name="Gerader Verbinder 64">
+              <a:extLst>
+                <a:ext uri="{FF2B5EF4-FFF2-40B4-BE49-F238E27FC236}">
+                  <a16:creationId xmlns:a16="http://schemas.microsoft.com/office/drawing/2014/main" id="{16122A47-110D-7982-851F-62DB6C086E4E}"/>
+                </a:ext>
+              </a:extLst>
+            </p:cNvPr>
+            <p:cNvCxnSpPr/>
+            <p:nvPr/>
+          </p:nvCxnSpPr>
+          <p:spPr>
+            <a:xfrm flipV="1">
+              <a:off x="3231978" y="1293746"/>
+              <a:ext cx="976730" cy="3064"/>
+            </a:xfrm>
+            <a:prstGeom prst="line">
+              <a:avLst/>
+            </a:prstGeom>
+            <a:ln>
+              <a:solidFill>
+                <a:schemeClr val="tx1"/>
+              </a:solidFill>
+            </a:ln>
+          </p:spPr>
+          <p:style>
+            <a:lnRef idx="1">
+              <a:schemeClr val="accent1"/>
+            </a:lnRef>
+            <a:fillRef idx="0">
+              <a:schemeClr val="accent1"/>
+            </a:fillRef>
+            <a:effectRef idx="0">
+              <a:schemeClr val="accent1"/>
+            </a:effectRef>
+            <a:fontRef idx="minor">
+              <a:schemeClr val="tx1"/>
+            </a:fontRef>
+          </p:style>
+        </p:cxnSp>
+        <p:sp>
+          <p:nvSpPr>
+            <p:cNvPr id="66" name="Textfeld 65">
+              <a:extLst>
+                <a:ext uri="{FF2B5EF4-FFF2-40B4-BE49-F238E27FC236}">
+                  <a16:creationId xmlns:a16="http://schemas.microsoft.com/office/drawing/2014/main" id="{F30CFCE4-A7F7-424D-1361-DDEC01FEE251}"/>
+                </a:ext>
+              </a:extLst>
+            </p:cNvPr>
+            <p:cNvSpPr txBox="1"/>
+            <p:nvPr/>
+          </p:nvSpPr>
+          <p:spPr>
+            <a:xfrm>
+              <a:off x="3352552" y="1342891"/>
+              <a:ext cx="781118" cy="276999"/>
+            </a:xfrm>
+            <a:prstGeom prst="rect">
+              <a:avLst/>
+            </a:prstGeom>
+            <a:noFill/>
+          </p:spPr>
+          <p:txBody>
+            <a:bodyPr wrap="square" rtlCol="0">
+              <a:spAutoFit/>
+            </a:bodyPr>
+            <a:lstStyle/>
+            <a:p>
+              <a:pPr algn="ctr"/>
+              <a:r>
+                <a:rPr lang="de-DE" sz="1200" b="1" dirty="0"/>
+                <a:t>12V AC</a:t>
+              </a:r>
+            </a:p>
+          </p:txBody>
+        </p:sp>
+      </p:grpSp>
+      <p:cxnSp>
+        <p:nvCxnSpPr>
+          <p:cNvPr id="69" name="Gerader Verbinder 68">
+            <a:extLst>
+              <a:ext uri="{FF2B5EF4-FFF2-40B4-BE49-F238E27FC236}">
+                <a16:creationId xmlns:a16="http://schemas.microsoft.com/office/drawing/2014/main" id="{9D2A6C8D-97A5-2E29-370F-EBD075EF34E5}"/>
+              </a:ext>
+            </a:extLst>
+          </p:cNvPr>
+          <p:cNvCxnSpPr/>
+          <p:nvPr/>
+        </p:nvCxnSpPr>
+        <p:spPr>
+          <a:xfrm>
+            <a:off x="4452774" y="2872363"/>
+            <a:ext cx="1430338" cy="0"/>
+          </a:xfrm>
+          <a:prstGeom prst="line">
+            <a:avLst/>
+          </a:prstGeom>
+          <a:ln w="28575">
+            <a:solidFill>
+              <a:srgbClr val="FF0000"/>
+            </a:solidFill>
+          </a:ln>
+        </p:spPr>
+        <p:style>
+          <a:lnRef idx="1">
+            <a:schemeClr val="accent1"/>
+          </a:lnRef>
+          <a:fillRef idx="0">
+            <a:schemeClr val="accent1"/>
+          </a:fillRef>
+          <a:effectRef idx="0">
+            <a:schemeClr val="accent1"/>
+          </a:effectRef>
+          <a:fontRef idx="minor">
+            <a:schemeClr val="tx1"/>
+          </a:fontRef>
+        </p:style>
+      </p:cxnSp>
+      <p:cxnSp>
+        <p:nvCxnSpPr>
+          <p:cNvPr id="71" name="Gerader Verbinder 70">
+            <a:extLst>
+              <a:ext uri="{FF2B5EF4-FFF2-40B4-BE49-F238E27FC236}">
+                <a16:creationId xmlns:a16="http://schemas.microsoft.com/office/drawing/2014/main" id="{74EEB673-B46A-1099-BAAD-BC5D2797EB35}"/>
+              </a:ext>
+            </a:extLst>
+          </p:cNvPr>
+          <p:cNvCxnSpPr/>
+          <p:nvPr/>
+        </p:nvCxnSpPr>
+        <p:spPr>
+          <a:xfrm flipH="1">
+            <a:off x="5883112" y="2551848"/>
+            <a:ext cx="1" cy="335178"/>
+          </a:xfrm>
+          <a:prstGeom prst="line">
+            <a:avLst/>
+          </a:prstGeom>
+          <a:ln w="28575">
+            <a:solidFill>
+              <a:srgbClr val="FF0000"/>
+            </a:solidFill>
+          </a:ln>
+        </p:spPr>
+        <p:style>
+          <a:lnRef idx="1">
+            <a:schemeClr val="accent1"/>
+          </a:lnRef>
+          <a:fillRef idx="0">
+            <a:schemeClr val="accent1"/>
+          </a:fillRef>
+          <a:effectRef idx="0">
+            <a:schemeClr val="accent1"/>
+          </a:effectRef>
+          <a:fontRef idx="minor">
+            <a:schemeClr val="tx1"/>
+          </a:fontRef>
+        </p:style>
+      </p:cxnSp>
+      <p:cxnSp>
+        <p:nvCxnSpPr>
+          <p:cNvPr id="73" name="Gerader Verbinder 72">
+            <a:extLst>
+              <a:ext uri="{FF2B5EF4-FFF2-40B4-BE49-F238E27FC236}">
+                <a16:creationId xmlns:a16="http://schemas.microsoft.com/office/drawing/2014/main" id="{2DA0B4B2-66F4-7A92-4E53-9A95214A2A3C}"/>
+              </a:ext>
+            </a:extLst>
+          </p:cNvPr>
+          <p:cNvCxnSpPr/>
+          <p:nvPr/>
+        </p:nvCxnSpPr>
+        <p:spPr>
+          <a:xfrm flipH="1">
+            <a:off x="6496141" y="2564043"/>
+            <a:ext cx="1" cy="335178"/>
+          </a:xfrm>
+          <a:prstGeom prst="line">
+            <a:avLst/>
+          </a:prstGeom>
+          <a:ln w="28575">
+            <a:solidFill>
+              <a:srgbClr val="FF0000"/>
+            </a:solidFill>
+          </a:ln>
+        </p:spPr>
+        <p:style>
+          <a:lnRef idx="1">
+            <a:schemeClr val="accent1"/>
+          </a:lnRef>
+          <a:fillRef idx="0">
+            <a:schemeClr val="accent1"/>
+          </a:fillRef>
+          <a:effectRef idx="0">
+            <a:schemeClr val="accent1"/>
+          </a:effectRef>
+          <a:fontRef idx="minor">
+            <a:schemeClr val="tx1"/>
+          </a:fontRef>
+        </p:style>
+      </p:cxnSp>
+      <p:cxnSp>
+        <p:nvCxnSpPr>
+          <p:cNvPr id="74" name="Gerader Verbinder 73">
+            <a:extLst>
+              <a:ext uri="{FF2B5EF4-FFF2-40B4-BE49-F238E27FC236}">
+                <a16:creationId xmlns:a16="http://schemas.microsoft.com/office/drawing/2014/main" id="{0D75390C-2C97-F39E-43C1-B6F75D45F516}"/>
+              </a:ext>
+            </a:extLst>
+          </p:cNvPr>
+          <p:cNvCxnSpPr/>
+          <p:nvPr/>
+        </p:nvCxnSpPr>
+        <p:spPr>
+          <a:xfrm flipV="1">
+            <a:off x="6498276" y="2881811"/>
+            <a:ext cx="2641632" cy="3358"/>
+          </a:xfrm>
+          <a:prstGeom prst="line">
+            <a:avLst/>
+          </a:prstGeom>
+          <a:ln w="28575">
+            <a:solidFill>
+              <a:srgbClr val="FF0000"/>
+            </a:solidFill>
+          </a:ln>
+        </p:spPr>
+        <p:style>
+          <a:lnRef idx="1">
+            <a:schemeClr val="accent1"/>
+          </a:lnRef>
+          <a:fillRef idx="0">
+            <a:schemeClr val="accent1"/>
+          </a:fillRef>
+          <a:effectRef idx="0">
+            <a:schemeClr val="accent1"/>
+          </a:effectRef>
+          <a:fontRef idx="minor">
+            <a:schemeClr val="tx1"/>
+          </a:fontRef>
+        </p:style>
+      </p:cxnSp>
+      <p:cxnSp>
+        <p:nvCxnSpPr>
+          <p:cNvPr id="75" name="Gerader Verbinder 74">
+            <a:extLst>
+              <a:ext uri="{FF2B5EF4-FFF2-40B4-BE49-F238E27FC236}">
+                <a16:creationId xmlns:a16="http://schemas.microsoft.com/office/drawing/2014/main" id="{AAF7B700-A5B7-0D84-C196-2FFCCF5F80D3}"/>
+              </a:ext>
+            </a:extLst>
+          </p:cNvPr>
+          <p:cNvCxnSpPr/>
+          <p:nvPr/>
+        </p:nvCxnSpPr>
+        <p:spPr>
+          <a:xfrm flipH="1">
+            <a:off x="9139908" y="2557063"/>
+            <a:ext cx="1" cy="335178"/>
+          </a:xfrm>
+          <a:prstGeom prst="line">
+            <a:avLst/>
+          </a:prstGeom>
+          <a:ln w="28575">
+            <a:solidFill>
+              <a:srgbClr val="FF0000"/>
+            </a:solidFill>
+          </a:ln>
+        </p:spPr>
+        <p:style>
+          <a:lnRef idx="1">
+            <a:schemeClr val="accent1"/>
+          </a:lnRef>
+          <a:fillRef idx="0">
+            <a:schemeClr val="accent1"/>
+          </a:fillRef>
+          <a:effectRef idx="0">
+            <a:schemeClr val="accent1"/>
+          </a:effectRef>
+          <a:fontRef idx="minor">
+            <a:schemeClr val="tx1"/>
+          </a:fontRef>
+        </p:style>
+      </p:cxnSp>
+      <p:cxnSp>
+        <p:nvCxnSpPr>
+          <p:cNvPr id="76" name="Gerader Verbinder 75">
+            <a:extLst>
+              <a:ext uri="{FF2B5EF4-FFF2-40B4-BE49-F238E27FC236}">
+                <a16:creationId xmlns:a16="http://schemas.microsoft.com/office/drawing/2014/main" id="{94EA0F9D-2A37-092F-A91A-A09B6735F3D1}"/>
+              </a:ext>
+            </a:extLst>
+          </p:cNvPr>
+          <p:cNvCxnSpPr/>
+          <p:nvPr/>
+        </p:nvCxnSpPr>
+        <p:spPr>
+          <a:xfrm flipH="1">
+            <a:off x="2410849" y="2512883"/>
+            <a:ext cx="2" cy="1963177"/>
+          </a:xfrm>
+          <a:prstGeom prst="line">
+            <a:avLst/>
+          </a:prstGeom>
+          <a:ln w="28575">
+            <a:solidFill>
+              <a:schemeClr val="tx1"/>
+            </a:solidFill>
+          </a:ln>
+        </p:spPr>
+        <p:style>
+          <a:lnRef idx="1">
+            <a:schemeClr val="accent1"/>
+          </a:lnRef>
+          <a:fillRef idx="0">
+            <a:schemeClr val="accent1"/>
+          </a:fillRef>
+          <a:effectRef idx="0">
+            <a:schemeClr val="accent1"/>
+          </a:effectRef>
+          <a:fontRef idx="minor">
+            <a:schemeClr val="tx1"/>
+          </a:fontRef>
+        </p:style>
+      </p:cxnSp>
+      <p:cxnSp>
+        <p:nvCxnSpPr>
+          <p:cNvPr id="77" name="Gerader Verbinder 76">
+            <a:extLst>
+              <a:ext uri="{FF2B5EF4-FFF2-40B4-BE49-F238E27FC236}">
+                <a16:creationId xmlns:a16="http://schemas.microsoft.com/office/drawing/2014/main" id="{DEC23110-3D0C-A580-7D74-2C9F1647D851}"/>
+              </a:ext>
+            </a:extLst>
+          </p:cNvPr>
+          <p:cNvCxnSpPr/>
+          <p:nvPr/>
+        </p:nvCxnSpPr>
+        <p:spPr>
+          <a:xfrm>
+            <a:off x="4651513" y="3057357"/>
+            <a:ext cx="5048254" cy="5015"/>
+          </a:xfrm>
+          <a:prstGeom prst="line">
+            <a:avLst/>
+          </a:prstGeom>
+          <a:ln w="28575">
+            <a:solidFill>
+              <a:schemeClr val="tx1"/>
+            </a:solidFill>
+          </a:ln>
+        </p:spPr>
+        <p:style>
+          <a:lnRef idx="1">
+            <a:schemeClr val="accent1"/>
+          </a:lnRef>
+          <a:fillRef idx="0">
+            <a:schemeClr val="accent1"/>
+          </a:fillRef>
+          <a:effectRef idx="0">
+            <a:schemeClr val="accent1"/>
+          </a:effectRef>
+          <a:fontRef idx="minor">
+            <a:schemeClr val="tx1"/>
+          </a:fontRef>
+        </p:style>
+      </p:cxnSp>
+      <p:cxnSp>
+        <p:nvCxnSpPr>
+          <p:cNvPr id="80" name="Gerader Verbinder 79">
+            <a:extLst>
+              <a:ext uri="{FF2B5EF4-FFF2-40B4-BE49-F238E27FC236}">
+                <a16:creationId xmlns:a16="http://schemas.microsoft.com/office/drawing/2014/main" id="{559B27F3-167C-13A6-D893-794BACAE88E6}"/>
+              </a:ext>
+            </a:extLst>
+          </p:cNvPr>
+          <p:cNvCxnSpPr/>
+          <p:nvPr/>
+        </p:nvCxnSpPr>
+        <p:spPr>
+          <a:xfrm>
+            <a:off x="9682904" y="2583272"/>
+            <a:ext cx="5395" cy="474085"/>
+          </a:xfrm>
+          <a:prstGeom prst="line">
+            <a:avLst/>
+          </a:prstGeom>
+          <a:ln w="28575">
+            <a:solidFill>
+              <a:schemeClr val="tx1"/>
+            </a:solidFill>
+          </a:ln>
+        </p:spPr>
+        <p:style>
+          <a:lnRef idx="1">
+            <a:schemeClr val="accent1"/>
+          </a:lnRef>
+          <a:fillRef idx="0">
+            <a:schemeClr val="accent1"/>
+          </a:fillRef>
+          <a:effectRef idx="0">
+            <a:schemeClr val="accent1"/>
+          </a:effectRef>
+          <a:fontRef idx="minor">
+            <a:schemeClr val="tx1"/>
+          </a:fontRef>
+        </p:style>
+      </p:cxnSp>
+      <p:cxnSp>
+        <p:nvCxnSpPr>
+          <p:cNvPr id="85" name="Gerader Verbinder 84">
+            <a:extLst>
+              <a:ext uri="{FF2B5EF4-FFF2-40B4-BE49-F238E27FC236}">
+                <a16:creationId xmlns:a16="http://schemas.microsoft.com/office/drawing/2014/main" id="{003926FA-52CC-A3DE-5F3A-A09D9F987929}"/>
+              </a:ext>
+            </a:extLst>
+          </p:cNvPr>
+          <p:cNvCxnSpPr/>
+          <p:nvPr/>
+        </p:nvCxnSpPr>
+        <p:spPr>
+          <a:xfrm>
+            <a:off x="2863949" y="4298788"/>
+            <a:ext cx="2199725" cy="0"/>
+          </a:xfrm>
+          <a:prstGeom prst="line">
+            <a:avLst/>
+          </a:prstGeom>
+          <a:ln w="28575">
+            <a:solidFill>
+              <a:srgbClr val="FF0000"/>
+            </a:solidFill>
+          </a:ln>
+        </p:spPr>
+        <p:style>
+          <a:lnRef idx="1">
+            <a:schemeClr val="accent1"/>
+          </a:lnRef>
+          <a:fillRef idx="0">
+            <a:schemeClr val="accent1"/>
+          </a:fillRef>
+          <a:effectRef idx="0">
+            <a:schemeClr val="accent1"/>
+          </a:effectRef>
+          <a:fontRef idx="minor">
+            <a:schemeClr val="tx1"/>
+          </a:fontRef>
+        </p:style>
+      </p:cxnSp>
+      <p:sp>
+        <p:nvSpPr>
+          <p:cNvPr id="97" name="Rechteck 96">
+            <a:extLst>
+              <a:ext uri="{FF2B5EF4-FFF2-40B4-BE49-F238E27FC236}">
+                <a16:creationId xmlns:a16="http://schemas.microsoft.com/office/drawing/2014/main" id="{754B8D05-6329-CBD9-47F0-B79D0C9752F3}"/>
+              </a:ext>
+            </a:extLst>
+          </p:cNvPr>
+          <p:cNvSpPr/>
+          <p:nvPr/>
+        </p:nvSpPr>
+        <p:spPr>
+          <a:xfrm>
+            <a:off x="3892887" y="909430"/>
+            <a:ext cx="4406287" cy="5237922"/>
+          </a:xfrm>
+          <a:prstGeom prst="rect">
+            <a:avLst/>
+          </a:prstGeom>
+          <a:noFill/>
+          <a:ln>
+            <a:solidFill>
+              <a:schemeClr val="bg1">
+                <a:lumMod val="65000"/>
+              </a:schemeClr>
+            </a:solidFill>
+          </a:ln>
+        </p:spPr>
+        <p:style>
+          <a:lnRef idx="2">
+            <a:schemeClr val="accent6"/>
+          </a:lnRef>
+          <a:fillRef idx="1">
+            <a:schemeClr val="lt1"/>
+          </a:fillRef>
+          <a:effectRef idx="0">
+            <a:schemeClr val="accent6"/>
+          </a:effectRef>
+          <a:fontRef idx="minor">
+            <a:schemeClr val="dk1"/>
+          </a:fontRef>
+        </p:style>
+        <p:txBody>
+          <a:bodyPr rtlCol="0" anchor="ctr"/>
+          <a:lstStyle/>
+          <a:p>
+            <a:pPr algn="ctr"/>
+            <a:endParaRPr lang="de-DE"/>
+          </a:p>
+        </p:txBody>
+      </p:sp>
+      <p:sp>
+        <p:nvSpPr>
+          <p:cNvPr id="98" name="Rechteck 97">
+            <a:extLst>
+              <a:ext uri="{FF2B5EF4-FFF2-40B4-BE49-F238E27FC236}">
+                <a16:creationId xmlns:a16="http://schemas.microsoft.com/office/drawing/2014/main" id="{54433805-3FDE-C87A-A7B4-B5E59C931686}"/>
+              </a:ext>
+            </a:extLst>
+          </p:cNvPr>
+          <p:cNvSpPr/>
+          <p:nvPr/>
+        </p:nvSpPr>
+        <p:spPr>
+          <a:xfrm>
+            <a:off x="8656897" y="909430"/>
+            <a:ext cx="1507395" cy="5237922"/>
+          </a:xfrm>
+          <a:prstGeom prst="rect">
+            <a:avLst/>
+          </a:prstGeom>
+          <a:noFill/>
+          <a:ln>
+            <a:solidFill>
+              <a:schemeClr val="bg1">
+                <a:lumMod val="65000"/>
+              </a:schemeClr>
+            </a:solidFill>
+          </a:ln>
+        </p:spPr>
+        <p:style>
+          <a:lnRef idx="2">
+            <a:schemeClr val="accent6"/>
+          </a:lnRef>
+          <a:fillRef idx="1">
+            <a:schemeClr val="lt1"/>
+          </a:fillRef>
+          <a:effectRef idx="0">
+            <a:schemeClr val="accent6"/>
+          </a:effectRef>
+          <a:fontRef idx="minor">
+            <a:schemeClr val="dk1"/>
+          </a:fontRef>
+        </p:style>
+        <p:txBody>
+          <a:bodyPr rtlCol="0" anchor="ctr"/>
+          <a:lstStyle/>
+          <a:p>
+            <a:pPr algn="ctr"/>
+            <a:endParaRPr lang="de-DE"/>
+          </a:p>
+        </p:txBody>
+      </p:sp>
+      <p:sp>
+        <p:nvSpPr>
+          <p:cNvPr id="99" name="Textfeld 98">
+            <a:extLst>
+              <a:ext uri="{FF2B5EF4-FFF2-40B4-BE49-F238E27FC236}">
+                <a16:creationId xmlns:a16="http://schemas.microsoft.com/office/drawing/2014/main" id="{E8B4DF53-AB0E-07BA-9E5C-852B7F162C26}"/>
+              </a:ext>
+            </a:extLst>
+          </p:cNvPr>
+          <p:cNvSpPr txBox="1"/>
+          <p:nvPr/>
+        </p:nvSpPr>
+        <p:spPr>
+          <a:xfrm>
+            <a:off x="3952521" y="5830181"/>
+            <a:ext cx="829586" cy="276999"/>
+          </a:xfrm>
+          <a:prstGeom prst="rect">
+            <a:avLst/>
+          </a:prstGeom>
+          <a:noFill/>
+        </p:spPr>
+        <p:txBody>
+          <a:bodyPr wrap="none" rtlCol="0">
+            <a:spAutoFit/>
+          </a:bodyPr>
+          <a:lstStyle/>
+          <a:p>
+            <a:pPr algn="ctr"/>
+            <a:r>
+              <a:rPr lang="de-DE" sz="1200" dirty="0"/>
+              <a:t>Location 2</a:t>
+            </a:r>
+          </a:p>
+        </p:txBody>
+      </p:sp>
+      <p:sp>
+        <p:nvSpPr>
+          <p:cNvPr id="100" name="Textfeld 99">
+            <a:extLst>
+              <a:ext uri="{FF2B5EF4-FFF2-40B4-BE49-F238E27FC236}">
+                <a16:creationId xmlns:a16="http://schemas.microsoft.com/office/drawing/2014/main" id="{9037C0CD-3252-2773-93F7-B3920BD835EC}"/>
+              </a:ext>
+            </a:extLst>
+          </p:cNvPr>
+          <p:cNvSpPr txBox="1"/>
+          <p:nvPr/>
+        </p:nvSpPr>
+        <p:spPr>
+          <a:xfrm>
+            <a:off x="8690375" y="5849178"/>
+            <a:ext cx="829586" cy="276999"/>
+          </a:xfrm>
+          <a:prstGeom prst="rect">
+            <a:avLst/>
+          </a:prstGeom>
+          <a:noFill/>
+        </p:spPr>
+        <p:txBody>
+          <a:bodyPr wrap="none" rtlCol="0">
+            <a:spAutoFit/>
+          </a:bodyPr>
+          <a:lstStyle/>
+          <a:p>
+            <a:pPr algn="ctr"/>
+            <a:r>
+              <a:rPr lang="de-DE" sz="1200" dirty="0"/>
+              <a:t>Location 3</a:t>
+            </a:r>
+          </a:p>
+        </p:txBody>
+      </p:sp>
+      <p:cxnSp>
+        <p:nvCxnSpPr>
+          <p:cNvPr id="106" name="Gerader Verbinder 105">
+            <a:extLst>
+              <a:ext uri="{FF2B5EF4-FFF2-40B4-BE49-F238E27FC236}">
+                <a16:creationId xmlns:a16="http://schemas.microsoft.com/office/drawing/2014/main" id="{54776566-74CF-0388-9CF7-C6FDB55D2A4F}"/>
+              </a:ext>
+            </a:extLst>
+          </p:cNvPr>
+          <p:cNvCxnSpPr/>
+          <p:nvPr/>
+        </p:nvCxnSpPr>
+        <p:spPr>
+          <a:xfrm>
+            <a:off x="4820480" y="5258699"/>
+            <a:ext cx="243194" cy="2373"/>
+          </a:xfrm>
+          <a:prstGeom prst="line">
+            <a:avLst/>
+          </a:prstGeom>
+          <a:ln w="28575">
+            <a:solidFill>
+              <a:schemeClr val="accent2"/>
+            </a:solidFill>
+          </a:ln>
+        </p:spPr>
+        <p:style>
+          <a:lnRef idx="1">
+            <a:schemeClr val="accent1"/>
+          </a:lnRef>
+          <a:fillRef idx="0">
+            <a:schemeClr val="accent1"/>
+          </a:fillRef>
+          <a:effectRef idx="0">
+            <a:schemeClr val="accent1"/>
+          </a:effectRef>
+          <a:fontRef idx="minor">
+            <a:schemeClr val="tx1"/>
+          </a:fontRef>
+        </p:style>
+      </p:cxnSp>
+      <p:cxnSp>
+        <p:nvCxnSpPr>
+          <p:cNvPr id="108" name="Gerader Verbinder 107">
+            <a:extLst>
+              <a:ext uri="{FF2B5EF4-FFF2-40B4-BE49-F238E27FC236}">
+                <a16:creationId xmlns:a16="http://schemas.microsoft.com/office/drawing/2014/main" id="{6F096685-DC0B-7447-E00A-379B5A76FEDE}"/>
+              </a:ext>
+            </a:extLst>
+          </p:cNvPr>
+          <p:cNvCxnSpPr/>
+          <p:nvPr/>
+        </p:nvCxnSpPr>
+        <p:spPr>
+          <a:xfrm>
+            <a:off x="4811942" y="3338424"/>
+            <a:ext cx="6581" cy="1920275"/>
+          </a:xfrm>
+          <a:prstGeom prst="line">
+            <a:avLst/>
+          </a:prstGeom>
+          <a:ln w="28575">
+            <a:solidFill>
+              <a:schemeClr val="accent2"/>
+            </a:solidFill>
+          </a:ln>
+        </p:spPr>
+        <p:style>
+          <a:lnRef idx="1">
+            <a:schemeClr val="accent1"/>
+          </a:lnRef>
+          <a:fillRef idx="0">
+            <a:schemeClr val="accent1"/>
+          </a:fillRef>
+          <a:effectRef idx="0">
+            <a:schemeClr val="accent1"/>
+          </a:effectRef>
+          <a:fontRef idx="minor">
+            <a:schemeClr val="tx1"/>
+          </a:fontRef>
+        </p:style>
+      </p:cxnSp>
+      <p:cxnSp>
+        <p:nvCxnSpPr>
+          <p:cNvPr id="110" name="Gerader Verbinder 109">
+            <a:extLst>
+              <a:ext uri="{FF2B5EF4-FFF2-40B4-BE49-F238E27FC236}">
+                <a16:creationId xmlns:a16="http://schemas.microsoft.com/office/drawing/2014/main" id="{A2D7F3D3-EC73-E4B8-E8FE-C79AB30DB942}"/>
+              </a:ext>
+            </a:extLst>
+          </p:cNvPr>
+          <p:cNvCxnSpPr/>
+          <p:nvPr/>
+        </p:nvCxnSpPr>
+        <p:spPr>
+          <a:xfrm flipH="1">
+            <a:off x="6504117" y="2883490"/>
+            <a:ext cx="1635" cy="465413"/>
+          </a:xfrm>
+          <a:prstGeom prst="line">
+            <a:avLst/>
+          </a:prstGeom>
+          <a:ln w="28575">
+            <a:solidFill>
+              <a:schemeClr val="accent2"/>
+            </a:solidFill>
+          </a:ln>
+        </p:spPr>
+        <p:style>
+          <a:lnRef idx="1">
+            <a:schemeClr val="accent1"/>
+          </a:lnRef>
+          <a:fillRef idx="0">
+            <a:schemeClr val="accent1"/>
+          </a:fillRef>
+          <a:effectRef idx="0">
+            <a:schemeClr val="accent1"/>
+          </a:effectRef>
+          <a:fontRef idx="minor">
+            <a:schemeClr val="tx1"/>
+          </a:fontRef>
+        </p:style>
+      </p:cxnSp>
+      <p:cxnSp>
+        <p:nvCxnSpPr>
+          <p:cNvPr id="112" name="Gerader Verbinder 111">
+            <a:extLst>
+              <a:ext uri="{FF2B5EF4-FFF2-40B4-BE49-F238E27FC236}">
+                <a16:creationId xmlns:a16="http://schemas.microsoft.com/office/drawing/2014/main" id="{CCCDBB76-ED9B-DD27-9162-9DB5DCE03D70}"/>
+              </a:ext>
+            </a:extLst>
+          </p:cNvPr>
+          <p:cNvCxnSpPr/>
+          <p:nvPr/>
+        </p:nvCxnSpPr>
+        <p:spPr>
+          <a:xfrm flipH="1">
+            <a:off x="4811934" y="3348903"/>
+            <a:ext cx="1683879" cy="1"/>
+          </a:xfrm>
+          <a:prstGeom prst="line">
+            <a:avLst/>
+          </a:prstGeom>
+          <a:ln w="28575">
+            <a:solidFill>
+              <a:schemeClr val="accent2"/>
+            </a:solidFill>
+          </a:ln>
+        </p:spPr>
+        <p:style>
+          <a:lnRef idx="1">
+            <a:schemeClr val="accent1"/>
+          </a:lnRef>
+          <a:fillRef idx="0">
+            <a:schemeClr val="accent1"/>
+          </a:fillRef>
+          <a:effectRef idx="0">
+            <a:schemeClr val="accent1"/>
+          </a:effectRef>
+          <a:fontRef idx="minor">
+            <a:schemeClr val="tx1"/>
+          </a:fontRef>
+        </p:style>
+      </p:cxnSp>
+      <p:cxnSp>
+        <p:nvCxnSpPr>
+          <p:cNvPr id="121" name="Gerader Verbinder 120">
+            <a:extLst>
+              <a:ext uri="{FF2B5EF4-FFF2-40B4-BE49-F238E27FC236}">
+                <a16:creationId xmlns:a16="http://schemas.microsoft.com/office/drawing/2014/main" id="{89F22986-3ED1-EFAE-1291-30A59358E37E}"/>
+              </a:ext>
+            </a:extLst>
+          </p:cNvPr>
+          <p:cNvCxnSpPr/>
+          <p:nvPr/>
+        </p:nvCxnSpPr>
+        <p:spPr>
+          <a:xfrm flipH="1">
+            <a:off x="4642904" y="3057357"/>
+            <a:ext cx="8611" cy="1404552"/>
+          </a:xfrm>
+          <a:prstGeom prst="line">
+            <a:avLst/>
+          </a:prstGeom>
+          <a:ln w="28575">
+            <a:solidFill>
+              <a:schemeClr val="tx1"/>
+            </a:solidFill>
+          </a:ln>
+        </p:spPr>
+        <p:style>
+          <a:lnRef idx="1">
+            <a:schemeClr val="accent1"/>
+          </a:lnRef>
+          <a:fillRef idx="0">
+            <a:schemeClr val="accent1"/>
+          </a:fillRef>
+          <a:effectRef idx="0">
+            <a:schemeClr val="accent1"/>
+          </a:effectRef>
+          <a:fontRef idx="minor">
+            <a:schemeClr val="tx1"/>
+          </a:fontRef>
+        </p:style>
+      </p:cxnSp>
+      <p:cxnSp>
+        <p:nvCxnSpPr>
+          <p:cNvPr id="124" name="Gerader Verbinder 123">
+            <a:extLst>
+              <a:ext uri="{FF2B5EF4-FFF2-40B4-BE49-F238E27FC236}">
+                <a16:creationId xmlns:a16="http://schemas.microsoft.com/office/drawing/2014/main" id="{C505E93C-A3B5-FF72-B987-727E165385BD}"/>
+              </a:ext>
+            </a:extLst>
+          </p:cNvPr>
+          <p:cNvCxnSpPr/>
+          <p:nvPr/>
+        </p:nvCxnSpPr>
+        <p:spPr>
+          <a:xfrm>
+            <a:off x="4454218" y="2872363"/>
+            <a:ext cx="1561" cy="1426198"/>
+          </a:xfrm>
+          <a:prstGeom prst="line">
+            <a:avLst/>
+          </a:prstGeom>
+          <a:ln w="28575">
+            <a:solidFill>
+              <a:srgbClr val="FF0000"/>
+            </a:solidFill>
+          </a:ln>
+        </p:spPr>
+        <p:style>
+          <a:lnRef idx="1">
+            <a:schemeClr val="accent1"/>
+          </a:lnRef>
+          <a:fillRef idx="0">
+            <a:schemeClr val="accent1"/>
+          </a:fillRef>
+          <a:effectRef idx="0">
+            <a:schemeClr val="accent1"/>
+          </a:effectRef>
+          <a:fontRef idx="minor">
+            <a:schemeClr val="tx1"/>
+          </a:fontRef>
+        </p:style>
+      </p:cxnSp>
+      <p:sp>
+        <p:nvSpPr>
+          <p:cNvPr id="135" name="Rechteck 134">
+            <a:extLst>
+              <a:ext uri="{FF2B5EF4-FFF2-40B4-BE49-F238E27FC236}">
+                <a16:creationId xmlns:a16="http://schemas.microsoft.com/office/drawing/2014/main" id="{10EB2D37-5327-0BEE-DE3E-C102E92A6569}"/>
+              </a:ext>
+            </a:extLst>
+          </p:cNvPr>
+          <p:cNvSpPr/>
+          <p:nvPr/>
+        </p:nvSpPr>
+        <p:spPr>
+          <a:xfrm>
+            <a:off x="1891886" y="903620"/>
+            <a:ext cx="1507395" cy="5237922"/>
+          </a:xfrm>
+          <a:prstGeom prst="rect">
+            <a:avLst/>
+          </a:prstGeom>
+          <a:noFill/>
+          <a:ln>
+            <a:solidFill>
+              <a:schemeClr val="bg1">
+                <a:lumMod val="65000"/>
+              </a:schemeClr>
+            </a:solidFill>
+          </a:ln>
+        </p:spPr>
+        <p:style>
+          <a:lnRef idx="2">
+            <a:schemeClr val="accent6"/>
+          </a:lnRef>
+          <a:fillRef idx="1">
+            <a:schemeClr val="lt1"/>
+          </a:fillRef>
+          <a:effectRef idx="0">
+            <a:schemeClr val="accent6"/>
+          </a:effectRef>
+          <a:fontRef idx="minor">
+            <a:schemeClr val="dk1"/>
+          </a:fontRef>
+        </p:style>
+        <p:txBody>
+          <a:bodyPr rtlCol="0" anchor="ctr"/>
+          <a:lstStyle/>
+          <a:p>
+            <a:pPr algn="ctr"/>
+            <a:endParaRPr lang="de-DE"/>
+          </a:p>
+        </p:txBody>
+      </p:sp>
+      <p:sp>
+        <p:nvSpPr>
+          <p:cNvPr id="136" name="Textfeld 135">
+            <a:extLst>
+              <a:ext uri="{FF2B5EF4-FFF2-40B4-BE49-F238E27FC236}">
+                <a16:creationId xmlns:a16="http://schemas.microsoft.com/office/drawing/2014/main" id="{C0282283-4495-482A-E76E-5154CBF23652}"/>
+              </a:ext>
+            </a:extLst>
+          </p:cNvPr>
+          <p:cNvSpPr txBox="1"/>
+          <p:nvPr/>
+        </p:nvSpPr>
+        <p:spPr>
+          <a:xfrm>
+            <a:off x="1891886" y="5849177"/>
+            <a:ext cx="829586" cy="276999"/>
+          </a:xfrm>
+          <a:prstGeom prst="rect">
+            <a:avLst/>
+          </a:prstGeom>
+          <a:noFill/>
+        </p:spPr>
+        <p:txBody>
+          <a:bodyPr wrap="none" rtlCol="0">
+            <a:spAutoFit/>
+          </a:bodyPr>
+          <a:lstStyle/>
+          <a:p>
+            <a:pPr algn="ctr"/>
+            <a:r>
+              <a:rPr lang="de-DE" sz="1200" dirty="0"/>
+              <a:t>Location 1</a:t>
+            </a:r>
+          </a:p>
+        </p:txBody>
+      </p:sp>
+      <p:sp>
+        <p:nvSpPr>
+          <p:cNvPr id="138" name="Rechteck 137">
+            <a:extLst>
+              <a:ext uri="{FF2B5EF4-FFF2-40B4-BE49-F238E27FC236}">
+                <a16:creationId xmlns:a16="http://schemas.microsoft.com/office/drawing/2014/main" id="{D9B28993-F213-6743-E761-E040F96C3713}"/>
+              </a:ext>
+            </a:extLst>
+          </p:cNvPr>
+          <p:cNvSpPr/>
+          <p:nvPr/>
+        </p:nvSpPr>
+        <p:spPr>
+          <a:xfrm>
+            <a:off x="5579581" y="5212467"/>
+            <a:ext cx="819455" cy="369332"/>
+          </a:xfrm>
+          <a:prstGeom prst="rect">
+            <a:avLst/>
+          </a:prstGeom>
+        </p:spPr>
+        <p:txBody>
+          <a:bodyPr wrap="none">
+            <a:spAutoFit/>
+          </a:bodyPr>
+          <a:lstStyle/>
+          <a:p>
+            <a:r>
+              <a:rPr lang="de-DE" sz="900" dirty="0">
+                <a:solidFill>
+                  <a:schemeClr val="bg1">
+                    <a:lumMod val="50000"/>
+                  </a:schemeClr>
+                </a:solidFill>
+              </a:rPr>
+              <a:t>AC 12V - 24V</a:t>
+            </a:r>
+          </a:p>
+          <a:p>
+            <a:r>
+              <a:rPr lang="de-DE" sz="900" dirty="0">
+                <a:solidFill>
+                  <a:schemeClr val="bg1">
+                    <a:lumMod val="50000"/>
+                  </a:schemeClr>
+                </a:solidFill>
+              </a:rPr>
+              <a:t>DC 2,2V - 36V</a:t>
+            </a:r>
+          </a:p>
+        </p:txBody>
+      </p:sp>
+      <p:sp>
+        <p:nvSpPr>
+          <p:cNvPr id="139" name="Rechteck 138">
+            <a:extLst>
+              <a:ext uri="{FF2B5EF4-FFF2-40B4-BE49-F238E27FC236}">
+                <a16:creationId xmlns:a16="http://schemas.microsoft.com/office/drawing/2014/main" id="{02FB65DE-063B-6BDC-5BCD-52578EE9F437}"/>
+              </a:ext>
+            </a:extLst>
+          </p:cNvPr>
+          <p:cNvSpPr/>
+          <p:nvPr/>
+        </p:nvSpPr>
+        <p:spPr>
+          <a:xfrm>
+            <a:off x="5594009" y="4143893"/>
+            <a:ext cx="790601" cy="369332"/>
+          </a:xfrm>
+          <a:prstGeom prst="rect">
+            <a:avLst/>
+          </a:prstGeom>
+        </p:spPr>
+        <p:txBody>
+          <a:bodyPr wrap="none">
+            <a:spAutoFit/>
+          </a:bodyPr>
+          <a:lstStyle/>
+          <a:p>
+            <a:r>
+              <a:rPr lang="de-DE" sz="900" dirty="0">
+                <a:solidFill>
+                  <a:schemeClr val="bg1">
+                    <a:lumMod val="50000"/>
+                  </a:schemeClr>
+                </a:solidFill>
+              </a:rPr>
+              <a:t>AC 12V - 24V</a:t>
+            </a:r>
+          </a:p>
+          <a:p>
+            <a:r>
+              <a:rPr lang="de-DE" sz="900" dirty="0">
+                <a:solidFill>
+                  <a:schemeClr val="bg1">
+                    <a:lumMod val="50000"/>
+                  </a:schemeClr>
+                </a:solidFill>
+              </a:rPr>
+              <a:t>DC 12V - 36V</a:t>
+            </a:r>
+          </a:p>
+        </p:txBody>
+      </p:sp>
+      <p:graphicFrame>
+        <p:nvGraphicFramePr>
+          <p:cNvPr id="140" name="Tabelle 139">
+            <a:extLst>
+              <a:ext uri="{FF2B5EF4-FFF2-40B4-BE49-F238E27FC236}">
+                <a16:creationId xmlns:a16="http://schemas.microsoft.com/office/drawing/2014/main" id="{BB40181E-7C83-CC00-8E57-A125F1C5367A}"/>
+              </a:ext>
+            </a:extLst>
+          </p:cNvPr>
+          <p:cNvGraphicFramePr>
+            <a:graphicFrameLocks noGrp="1"/>
+          </p:cNvGraphicFramePr>
+          <p:nvPr/>
+        </p:nvGraphicFramePr>
+        <p:xfrm>
+          <a:off x="5068807" y="4212447"/>
+          <a:ext cx="208280" cy="1307520"/>
+        </p:xfrm>
+        <a:graphic>
+          <a:graphicData uri="http://schemas.openxmlformats.org/drawingml/2006/table">
+            <a:tbl>
+              <a:tblPr firstRow="1" bandRow="1">
+                <a:tableStyleId>{5940675A-B579-460E-94D1-54222C63F5DA}</a:tableStyleId>
+              </a:tblPr>
+              <a:tblGrid>
+                <a:gridCol w="208280">
+                  <a:extLst>
+                    <a:ext uri="{9D8B030D-6E8A-4147-A177-3AD203B41FA5}">
+                      <a16:colId xmlns:a16="http://schemas.microsoft.com/office/drawing/2014/main" val="20000"/>
+                    </a:ext>
+                  </a:extLst>
+                </a:gridCol>
+              </a:tblGrid>
+              <a:tr h="153141">
+                <a:tc>
+                  <a:txBody>
+                    <a:bodyPr/>
+                    <a:lstStyle/>
+                    <a:p>
+                      <a:pPr algn="ctr"/>
+                      <a:r>
+                        <a:rPr lang="de-DE" sz="600" dirty="0"/>
+                        <a:t>1</a:t>
+                      </a:r>
+                    </a:p>
+                  </a:txBody>
+                  <a:tcPr marL="36000" marR="36000" marT="36000" marB="36000" anchor="ctr">
+                    <a:solidFill>
+                      <a:srgbClr val="FF0000"/>
+                    </a:solidFill>
+                  </a:tcPr>
+                </a:tc>
+                <a:extLst>
+                  <a:ext uri="{0D108BD9-81ED-4DB2-BD59-A6C34878D82A}">
+                    <a16:rowId xmlns:a16="http://schemas.microsoft.com/office/drawing/2014/main" val="10000"/>
+                  </a:ext>
+                </a:extLst>
+              </a:tr>
+              <a:tr h="153141">
+                <a:tc>
+                  <a:txBody>
+                    <a:bodyPr/>
+                    <a:lstStyle/>
+                    <a:p>
+                      <a:pPr algn="ctr"/>
+                      <a:r>
+                        <a:rPr lang="de-DE" sz="600" dirty="0"/>
+                        <a:t>2</a:t>
+                      </a:r>
+                    </a:p>
+                  </a:txBody>
+                  <a:tcPr marL="36000" marR="36000" marT="36000" marB="36000" anchor="ctr">
+                    <a:solidFill>
+                      <a:schemeClr val="tx1">
+                        <a:lumMod val="65000"/>
+                        <a:lumOff val="35000"/>
+                      </a:schemeClr>
+                    </a:solidFill>
+                  </a:tcPr>
+                </a:tc>
+                <a:extLst>
+                  <a:ext uri="{0D108BD9-81ED-4DB2-BD59-A6C34878D82A}">
+                    <a16:rowId xmlns:a16="http://schemas.microsoft.com/office/drawing/2014/main" val="10001"/>
+                  </a:ext>
+                </a:extLst>
+              </a:tr>
+              <a:tr h="153141">
+                <a:tc>
+                  <a:txBody>
+                    <a:bodyPr/>
+                    <a:lstStyle/>
+                    <a:p>
+                      <a:pPr algn="ctr"/>
+                      <a:r>
+                        <a:rPr lang="de-DE" sz="600" dirty="0"/>
+                        <a:t>3</a:t>
+                      </a:r>
+                    </a:p>
+                  </a:txBody>
+                  <a:tcPr marL="36000" marR="36000" marT="36000" marB="36000" anchor="ctr">
+                    <a:solidFill>
+                      <a:schemeClr val="bg1">
+                        <a:lumMod val="95000"/>
+                      </a:schemeClr>
+                    </a:solidFill>
+                  </a:tcPr>
+                </a:tc>
+                <a:extLst>
+                  <a:ext uri="{0D108BD9-81ED-4DB2-BD59-A6C34878D82A}">
+                    <a16:rowId xmlns:a16="http://schemas.microsoft.com/office/drawing/2014/main" val="10002"/>
+                  </a:ext>
+                </a:extLst>
+              </a:tr>
+              <a:tr h="153141">
+                <a:tc>
+                  <a:txBody>
+                    <a:bodyPr/>
+                    <a:lstStyle/>
+                    <a:p>
+                      <a:pPr algn="ctr"/>
+                      <a:r>
+                        <a:rPr lang="de-DE" sz="600" dirty="0"/>
+                        <a:t>4</a:t>
+                      </a:r>
+                    </a:p>
+                  </a:txBody>
+                  <a:tcPr marL="36000" marR="36000" marT="36000" marB="36000" anchor="ctr">
+                    <a:solidFill>
+                      <a:srgbClr val="FFFF00"/>
+                    </a:solidFill>
+                  </a:tcPr>
+                </a:tc>
+                <a:extLst>
+                  <a:ext uri="{0D108BD9-81ED-4DB2-BD59-A6C34878D82A}">
+                    <a16:rowId xmlns:a16="http://schemas.microsoft.com/office/drawing/2014/main" val="10003"/>
+                  </a:ext>
+                </a:extLst>
+              </a:tr>
+              <a:tr h="153141">
+                <a:tc>
+                  <a:txBody>
+                    <a:bodyPr/>
+                    <a:lstStyle/>
+                    <a:p>
+                      <a:pPr algn="ctr"/>
+                      <a:r>
+                        <a:rPr lang="de-DE" sz="600" dirty="0"/>
+                        <a:t>5</a:t>
+                      </a:r>
+                    </a:p>
+                  </a:txBody>
+                  <a:tcPr marL="36000" marR="36000" marT="36000" marB="36000" anchor="ctr">
+                    <a:solidFill>
+                      <a:srgbClr val="00B0F0"/>
+                    </a:solidFill>
+                  </a:tcPr>
+                </a:tc>
+                <a:extLst>
+                  <a:ext uri="{0D108BD9-81ED-4DB2-BD59-A6C34878D82A}">
+                    <a16:rowId xmlns:a16="http://schemas.microsoft.com/office/drawing/2014/main" val="10004"/>
+                  </a:ext>
+                </a:extLst>
+              </a:tr>
+              <a:tr h="153141">
+                <a:tc>
+                  <a:txBody>
+                    <a:bodyPr/>
+                    <a:lstStyle/>
+                    <a:p>
+                      <a:pPr algn="ctr"/>
+                      <a:r>
+                        <a:rPr lang="de-DE" sz="600" dirty="0"/>
+                        <a:t>6</a:t>
+                      </a:r>
+                    </a:p>
+                  </a:txBody>
+                  <a:tcPr marL="36000" marR="36000" marT="36000" marB="36000" anchor="ctr">
+                    <a:solidFill>
+                      <a:srgbClr val="00B050"/>
+                    </a:solidFill>
+                  </a:tcPr>
+                </a:tc>
+                <a:extLst>
+                  <a:ext uri="{0D108BD9-81ED-4DB2-BD59-A6C34878D82A}">
+                    <a16:rowId xmlns:a16="http://schemas.microsoft.com/office/drawing/2014/main" val="10005"/>
+                  </a:ext>
+                </a:extLst>
+              </a:tr>
+              <a:tr h="153141">
+                <a:tc>
+                  <a:txBody>
+                    <a:bodyPr/>
+                    <a:lstStyle/>
+                    <a:p>
+                      <a:pPr algn="ctr"/>
+                      <a:r>
+                        <a:rPr lang="de-DE" sz="600" dirty="0"/>
+                        <a:t>7</a:t>
+                      </a:r>
+                    </a:p>
+                  </a:txBody>
+                  <a:tcPr marL="36000" marR="36000" marT="36000" marB="36000" anchor="ctr">
+                    <a:solidFill>
+                      <a:schemeClr val="accent2">
+                        <a:lumMod val="75000"/>
+                      </a:schemeClr>
+                    </a:solidFill>
+                  </a:tcPr>
+                </a:tc>
+                <a:extLst>
+                  <a:ext uri="{0D108BD9-81ED-4DB2-BD59-A6C34878D82A}">
+                    <a16:rowId xmlns:a16="http://schemas.microsoft.com/office/drawing/2014/main" val="10006"/>
+                  </a:ext>
+                </a:extLst>
+              </a:tr>
+              <a:tr h="153141">
+                <a:tc>
+                  <a:txBody>
+                    <a:bodyPr/>
+                    <a:lstStyle/>
+                    <a:p>
+                      <a:pPr algn="ctr"/>
+                      <a:r>
+                        <a:rPr lang="de-DE" sz="600" dirty="0"/>
+                        <a:t>8</a:t>
+                      </a:r>
+                    </a:p>
+                  </a:txBody>
+                  <a:tcPr marL="36000" marR="36000" marT="36000" marB="36000" anchor="ctr">
+                    <a:solidFill>
+                      <a:schemeClr val="accent2">
+                        <a:lumMod val="50000"/>
+                      </a:schemeClr>
+                    </a:solidFill>
+                  </a:tcPr>
+                </a:tc>
+                <a:extLst>
+                  <a:ext uri="{0D108BD9-81ED-4DB2-BD59-A6C34878D82A}">
+                    <a16:rowId xmlns:a16="http://schemas.microsoft.com/office/drawing/2014/main" val="10007"/>
+                  </a:ext>
+                </a:extLst>
+              </a:tr>
+            </a:tbl>
+          </a:graphicData>
+        </a:graphic>
+      </p:graphicFrame>
+      <p:sp>
+        <p:nvSpPr>
+          <p:cNvPr id="148" name="Textfeld 147">
+            <a:extLst>
+              <a:ext uri="{FF2B5EF4-FFF2-40B4-BE49-F238E27FC236}">
+                <a16:creationId xmlns:a16="http://schemas.microsoft.com/office/drawing/2014/main" id="{F6F3A137-A2C3-D1D8-2494-AE98713D1620}"/>
+              </a:ext>
+            </a:extLst>
+          </p:cNvPr>
+          <p:cNvSpPr txBox="1"/>
+          <p:nvPr/>
+        </p:nvSpPr>
+        <p:spPr>
+          <a:xfrm rot="16200000">
+            <a:off x="-1197429" y="5074033"/>
+            <a:ext cx="2896434" cy="369332"/>
+          </a:xfrm>
+          <a:prstGeom prst="rect">
+            <a:avLst/>
+          </a:prstGeom>
+          <a:noFill/>
+        </p:spPr>
+        <p:txBody>
+          <a:bodyPr wrap="none" rtlCol="0">
+            <a:spAutoFit/>
+          </a:bodyPr>
+          <a:lstStyle/>
+          <a:p>
+            <a:r>
+              <a:rPr lang="de-DE" dirty="0"/>
+              <a:t>CIRCUIT DIAGRAM Shelly Uni</a:t>
+            </a:r>
+          </a:p>
+        </p:txBody>
+      </p:sp>
+    </p:spTree>
+    <p:extLst>
+      <p:ext uri="{BB962C8B-B14F-4D97-AF65-F5344CB8AC3E}">
+        <p14:creationId xmlns:p14="http://schemas.microsoft.com/office/powerpoint/2010/main" val="2024807615"/>
       </p:ext>
     </p:extLst>
   </p:cSld>

</xml_diff>